<commit_message>
PSO algorithm and flowchart added to ppt
</commit_message>
<xml_diff>
--- a/Documentation/Presentation (interim demo).pptx
+++ b/Documentation/Presentation (interim demo).pptx
@@ -7,10 +7,13 @@
   <p:sldIdLst>
     <p:sldId id="256" r:id="rId2"/>
     <p:sldId id="257" r:id="rId3"/>
-    <p:sldId id="258" r:id="rId4"/>
-    <p:sldId id="259" r:id="rId5"/>
-    <p:sldId id="261" r:id="rId6"/>
-    <p:sldId id="260" r:id="rId7"/>
+    <p:sldId id="264" r:id="rId4"/>
+    <p:sldId id="262" r:id="rId5"/>
+    <p:sldId id="258" r:id="rId6"/>
+    <p:sldId id="259" r:id="rId7"/>
+    <p:sldId id="261" r:id="rId8"/>
+    <p:sldId id="260" r:id="rId9"/>
+    <p:sldId id="263" r:id="rId10"/>
   </p:sldIdLst>
   <p:sldSz cx="9144000" cy="6858000" type="screen4x3"/>
   <p:notesSz cx="6858000" cy="9144000"/>
@@ -109,6 +112,22 @@
       </a:defRPr>
     </a:lvl9pPr>
   </p:defaultTextStyle>
+  <p:extLst>
+    <p:ext uri="{EFAFB233-063F-42B5-8137-9DF3F51BA10A}">
+      <p15:sldGuideLst xmlns:p15="http://schemas.microsoft.com/office/powerpoint/2012/main">
+        <p15:guide id="1" orient="horz" pos="2160">
+          <p15:clr>
+            <a:srgbClr val="A4A3A4"/>
+          </p15:clr>
+        </p15:guide>
+        <p15:guide id="2" pos="2880">
+          <p15:clr>
+            <a:srgbClr val="A4A3A4"/>
+          </p15:clr>
+        </p15:guide>
+      </p15:sldGuideLst>
+    </p:ext>
+  </p:extLst>
 </p:presentation>
 </file>
 
@@ -3186,7 +3205,12 @@
             <p:ph type="ctrTitle"/>
           </p:nvPr>
         </p:nvSpPr>
-        <p:spPr/>
+        <p:spPr>
+          <a:xfrm>
+            <a:off x="457200" y="1219200"/>
+            <a:ext cx="7543800" cy="2593975"/>
+          </a:xfrm>
+        </p:spPr>
         <p:txBody>
           <a:bodyPr>
             <a:normAutofit/>
@@ -3219,7 +3243,7 @@
         </p:nvSpPr>
         <p:spPr>
           <a:xfrm>
-            <a:off x="5410200" y="4953000"/>
+            <a:off x="5029200" y="4267200"/>
             <a:ext cx="3505200" cy="1752600"/>
           </a:xfrm>
         </p:spPr>
@@ -3308,6 +3332,13 @@
   <p:clrMapOvr>
     <a:masterClrMapping/>
   </p:clrMapOvr>
+  <p:timing>
+    <p:tnLst>
+      <p:par>
+        <p:cTn id="1" dur="indefinite" restart="never" nodeType="tmRoot"/>
+      </p:par>
+    </p:tnLst>
+  </p:timing>
 </p:sld>
 </file>
 
@@ -3538,10 +3569,6 @@
               </a:rPr>
               <a:t>: predicting score of a football team using a math equation.</a:t>
             </a:r>
-            <a:endParaRPr lang="en-US" sz="2400" dirty="0">
-              <a:latin typeface="Times New Roman" pitchFamily="18" charset="0"/>
-              <a:cs typeface="Times New Roman" pitchFamily="18" charset="0"/>
-            </a:endParaRPr>
           </a:p>
         </p:txBody>
       </p:sp>
@@ -3555,6 +3582,13 @@
   <p:clrMapOvr>
     <a:masterClrMapping/>
   </p:clrMapOvr>
+  <p:timing>
+    <p:tnLst>
+      <p:par>
+        <p:cTn id="1" dur="indefinite" restart="never" nodeType="tmRoot"/>
+      </p:par>
+    </p:tnLst>
+  </p:timing>
 </p:sld>
 </file>
 
@@ -3585,56 +3619,89 @@
             <p:ph type="title"/>
           </p:nvPr>
         </p:nvSpPr>
-        <p:spPr/>
-        <p:txBody>
-          <a:bodyPr>
-            <a:normAutofit/>
-          </a:bodyPr>
-          <a:lstStyle/>
-          <a:p>
-            <a:r>
-              <a:rPr lang="en-US" sz="3600" dirty="0" smtClean="0">
-                <a:latin typeface="Times New Roman" pitchFamily="18" charset="0"/>
-                <a:cs typeface="Times New Roman" pitchFamily="18" charset="0"/>
-              </a:rPr>
-              <a:t>Important concepts and functions in PSO.</a:t>
-            </a:r>
-            <a:endParaRPr lang="en-US" sz="3600" dirty="0">
-              <a:latin typeface="Times New Roman" pitchFamily="18" charset="0"/>
-              <a:cs typeface="Times New Roman" pitchFamily="18" charset="0"/>
-            </a:endParaRPr>
-          </a:p>
-        </p:txBody>
-      </p:sp>
-      <p:sp>
-        <p:nvSpPr>
-          <p:cNvPr id="3" name="Content Placeholder 2"/>
-          <p:cNvSpPr>
-            <a:spLocks noGrp="1"/>
-          </p:cNvSpPr>
+        <p:spPr>
+          <a:xfrm>
+            <a:off x="457200" y="152400"/>
+            <a:ext cx="7620000" cy="1143000"/>
+          </a:xfrm>
+        </p:spPr>
+        <p:txBody>
+          <a:bodyPr/>
+          <a:lstStyle/>
+          <a:p>
+            <a:r>
+              <a:rPr lang="en-US" sz="4400" dirty="0" smtClean="0"/>
+              <a:t>PSO Flowchart:</a:t>
+            </a:r>
+            <a:r>
+              <a:rPr lang="en-US" dirty="0"/>
+              <a:t/>
+            </a:r>
+            <a:br>
+              <a:rPr lang="en-US" dirty="0"/>
+            </a:br>
+            <a:r>
+              <a:rPr lang="en-US" sz="2400" dirty="0" smtClean="0"/>
+              <a:t>An approach towards PSO problem</a:t>
+            </a:r>
+            <a:endParaRPr lang="en-GB" dirty="0"/>
+          </a:p>
+        </p:txBody>
+      </p:sp>
+      <p:pic>
+        <p:nvPicPr>
+          <p:cNvPr id="4" name="Content Placeholder 3" descr="973093.fig.001"/>
+          <p:cNvPicPr>
+            <a:picLocks noGrp="1"/>
+          </p:cNvPicPr>
           <p:nvPr>
             <p:ph idx="1"/>
           </p:nvPr>
-        </p:nvSpPr>
-        <p:spPr/>
-        <p:txBody>
-          <a:bodyPr/>
-          <a:lstStyle/>
-          <a:p>
-            <a:endParaRPr lang="en-US" dirty="0"/>
-          </a:p>
-        </p:txBody>
-      </p:sp>
+        </p:nvPicPr>
+        <p:blipFill>
+          <a:blip r:embed="rId2">
+            <a:extLst>
+              <a:ext uri="{28A0092B-C50C-407E-A947-70E740481C1C}">
+                <a14:useLocalDpi xmlns:a14="http://schemas.microsoft.com/office/drawing/2010/main" val="0"/>
+              </a:ext>
+            </a:extLst>
+          </a:blip>
+          <a:srcRect/>
+          <a:stretch>
+            <a:fillRect/>
+          </a:stretch>
+        </p:blipFill>
+        <p:spPr bwMode="auto">
+          <a:xfrm>
+            <a:off x="2362200" y="1312101"/>
+            <a:ext cx="3810000" cy="5048925"/>
+          </a:xfrm>
+          <a:prstGeom prst="rect">
+            <a:avLst/>
+          </a:prstGeom>
+          <a:noFill/>
+          <a:ln>
+            <a:noFill/>
+          </a:ln>
+        </p:spPr>
+      </p:pic>
     </p:spTree>
     <p:extLst>
       <p:ext uri="{BB962C8B-B14F-4D97-AF65-F5344CB8AC3E}">
-        <p14:creationId xmlns:p14="http://schemas.microsoft.com/office/powerpoint/2010/main" val="3792755165"/>
+        <p14:creationId xmlns:p14="http://schemas.microsoft.com/office/powerpoint/2010/main" val="3379351798"/>
       </p:ext>
     </p:extLst>
   </p:cSld>
   <p:clrMapOvr>
     <a:masterClrMapping/>
   </p:clrMapOvr>
+  <p:timing>
+    <p:tnLst>
+      <p:par>
+        <p:cTn id="1" dur="indefinite" restart="never" nodeType="tmRoot"/>
+      </p:par>
+    </p:tnLst>
+  </p:timing>
 </p:sld>
 </file>
 
@@ -3665,57 +3732,102 @@
             <p:ph type="title"/>
           </p:nvPr>
         </p:nvSpPr>
-        <p:spPr/>
-        <p:txBody>
-          <a:bodyPr>
-            <a:normAutofit/>
+        <p:spPr>
+          <a:xfrm>
+            <a:off x="479946" y="174508"/>
+            <a:ext cx="7620000" cy="1143000"/>
+          </a:xfrm>
+        </p:spPr>
+        <p:txBody>
+          <a:bodyPr/>
+          <a:lstStyle/>
+          <a:p>
+            <a:r>
+              <a:rPr lang="en-US" dirty="0" smtClean="0"/>
+              <a:t>PSO Algorithm:</a:t>
+            </a:r>
+            <a:endParaRPr lang="en-GB" dirty="0"/>
+          </a:p>
+        </p:txBody>
+      </p:sp>
+      <p:pic>
+        <p:nvPicPr>
+          <p:cNvPr id="4" name="Content Placeholder 3"/>
+          <p:cNvPicPr>
+            <a:picLocks noGrp="1" noChangeAspect="1"/>
+          </p:cNvPicPr>
+          <p:nvPr>
+            <p:ph idx="1"/>
+          </p:nvPr>
+        </p:nvPicPr>
+        <p:blipFill>
+          <a:blip r:embed="rId2">
+            <a:extLst>
+              <a:ext uri="{28A0092B-C50C-407E-A947-70E740481C1C}">
+                <a14:useLocalDpi xmlns:a14="http://schemas.microsoft.com/office/drawing/2010/main" val="0"/>
+              </a:ext>
+            </a:extLst>
+          </a:blip>
+          <a:stretch>
+            <a:fillRect/>
+          </a:stretch>
+        </p:blipFill>
+        <p:spPr>
+          <a:xfrm>
+            <a:off x="503830" y="1219200"/>
+            <a:ext cx="5455134" cy="4872843"/>
+          </a:xfrm>
+        </p:spPr>
+      </p:pic>
+      <p:sp>
+        <p:nvSpPr>
+          <p:cNvPr id="6" name="TextBox 5"/>
+          <p:cNvSpPr txBox="1"/>
+          <p:nvPr/>
+        </p:nvSpPr>
+        <p:spPr>
+          <a:xfrm>
+            <a:off x="457200" y="6400800"/>
+            <a:ext cx="6553200" cy="292388"/>
+          </a:xfrm>
+          <a:prstGeom prst="rect">
+            <a:avLst/>
+          </a:prstGeom>
+          <a:noFill/>
+        </p:spPr>
+        <p:txBody>
+          <a:bodyPr wrap="square" rtlCol="0">
+            <a:spAutoFit/>
           </a:bodyPr>
           <a:lstStyle/>
           <a:p>
-            <a:pPr algn="l"/>
-            <a:r>
-              <a:rPr lang="en-US" sz="3600" dirty="0" smtClean="0">
-                <a:latin typeface="Times New Roman" pitchFamily="18" charset="0"/>
-                <a:cs typeface="Times New Roman" pitchFamily="18" charset="0"/>
+            <a:r>
+              <a:rPr lang="en-GB" sz="1300" dirty="0">
+                <a:hlinkClick r:id="rId3"/>
               </a:rPr>
-              <a:t>Theoretical Analysis (time complexity)</a:t>
-            </a:r>
-            <a:endParaRPr lang="en-US" sz="3600" dirty="0">
-              <a:latin typeface="Times New Roman" pitchFamily="18" charset="0"/>
-              <a:cs typeface="Times New Roman" pitchFamily="18" charset="0"/>
-            </a:endParaRPr>
-          </a:p>
-        </p:txBody>
-      </p:sp>
-      <p:sp>
-        <p:nvSpPr>
-          <p:cNvPr id="3" name="Content Placeholder 2"/>
-          <p:cNvSpPr>
-            <a:spLocks noGrp="1"/>
-          </p:cNvSpPr>
-          <p:nvPr>
-            <p:ph idx="1"/>
-          </p:nvPr>
-        </p:nvSpPr>
-        <p:spPr/>
-        <p:txBody>
-          <a:bodyPr/>
-          <a:lstStyle/>
-          <a:p>
-            <a:endParaRPr lang="en-US"/>
+              <a:t>https://www.researchgate.net/figure/The-pseudocode-of-the-PSO-algorithm_fig8_274460300</a:t>
+            </a:r>
+            <a:endParaRPr lang="en-GB" sz="1300" dirty="0"/>
           </a:p>
         </p:txBody>
       </p:sp>
     </p:spTree>
     <p:extLst>
       <p:ext uri="{BB962C8B-B14F-4D97-AF65-F5344CB8AC3E}">
-        <p14:creationId xmlns:p14="http://schemas.microsoft.com/office/powerpoint/2010/main" val="767474351"/>
+        <p14:creationId xmlns:p14="http://schemas.microsoft.com/office/powerpoint/2010/main" val="1056964905"/>
       </p:ext>
     </p:extLst>
   </p:cSld>
   <p:clrMapOvr>
     <a:masterClrMapping/>
   </p:clrMapOvr>
+  <p:timing>
+    <p:tnLst>
+      <p:par>
+        <p:cTn id="1" dur="indefinite" restart="never" nodeType="tmRoot"/>
+      </p:par>
+    </p:tnLst>
+  </p:timing>
 </p:sld>
 </file>
 
@@ -3753,13 +3865,12 @@
           </a:bodyPr>
           <a:lstStyle/>
           <a:p>
-            <a:pPr algn="l"/>
             <a:r>
               <a:rPr lang="en-US" sz="3600" dirty="0" smtClean="0">
                 <a:latin typeface="Times New Roman" pitchFamily="18" charset="0"/>
                 <a:cs typeface="Times New Roman" pitchFamily="18" charset="0"/>
               </a:rPr>
-              <a:t>Implementation of PSO</a:t>
+              <a:t>Important concepts and functions in PSO.</a:t>
             </a:r>
             <a:endParaRPr lang="en-US" sz="3600" dirty="0">
               <a:latin typeface="Times New Roman" pitchFamily="18" charset="0"/>
@@ -3790,7 +3901,7 @@
     </p:spTree>
     <p:extLst>
       <p:ext uri="{BB962C8B-B14F-4D97-AF65-F5344CB8AC3E}">
-        <p14:creationId xmlns:p14="http://schemas.microsoft.com/office/powerpoint/2010/main" val="3472087063"/>
+        <p14:creationId xmlns:p14="http://schemas.microsoft.com/office/powerpoint/2010/main" val="3792755165"/>
       </p:ext>
     </p:extLst>
   </p:cSld>
@@ -3840,7 +3951,7 @@
                 <a:latin typeface="Times New Roman" pitchFamily="18" charset="0"/>
                 <a:cs typeface="Times New Roman" pitchFamily="18" charset="0"/>
               </a:rPr>
-              <a:t>Experimental Analysis </a:t>
+              <a:t>Theoretical Analysis (time complexity)</a:t>
             </a:r>
             <a:endParaRPr lang="en-US" sz="3600" dirty="0">
               <a:latin typeface="Times New Roman" pitchFamily="18" charset="0"/>
@@ -3871,7 +3982,266 @@
     </p:spTree>
     <p:extLst>
       <p:ext uri="{BB962C8B-B14F-4D97-AF65-F5344CB8AC3E}">
+        <p14:creationId xmlns:p14="http://schemas.microsoft.com/office/powerpoint/2010/main" val="767474351"/>
+      </p:ext>
+    </p:extLst>
+  </p:cSld>
+  <p:clrMapOvr>
+    <a:masterClrMapping/>
+  </p:clrMapOvr>
+</p:sld>
+</file>
+
+<file path=ppt/slides/slide7.xml><?xml version="1.0" encoding="utf-8"?>
+<p:sld xmlns:a="http://schemas.openxmlformats.org/drawingml/2006/main" xmlns:r="http://schemas.openxmlformats.org/officeDocument/2006/relationships" xmlns:p="http://schemas.openxmlformats.org/presentationml/2006/main">
+  <p:cSld>
+    <p:spTree>
+      <p:nvGrpSpPr>
+        <p:cNvPr id="1" name=""/>
+        <p:cNvGrpSpPr/>
+        <p:nvPr/>
+      </p:nvGrpSpPr>
+      <p:grpSpPr>
+        <a:xfrm>
+          <a:off x="0" y="0"/>
+          <a:ext cx="0" cy="0"/>
+          <a:chOff x="0" y="0"/>
+          <a:chExt cx="0" cy="0"/>
+        </a:xfrm>
+      </p:grpSpPr>
+      <p:sp>
+        <p:nvSpPr>
+          <p:cNvPr id="2" name="Title 1"/>
+          <p:cNvSpPr>
+            <a:spLocks noGrp="1"/>
+          </p:cNvSpPr>
+          <p:nvPr>
+            <p:ph type="title"/>
+          </p:nvPr>
+        </p:nvSpPr>
+        <p:spPr/>
+        <p:txBody>
+          <a:bodyPr>
+            <a:normAutofit/>
+          </a:bodyPr>
+          <a:lstStyle/>
+          <a:p>
+            <a:pPr algn="l"/>
+            <a:r>
+              <a:rPr lang="en-US" sz="3600" dirty="0" smtClean="0">
+                <a:latin typeface="Times New Roman" pitchFamily="18" charset="0"/>
+                <a:cs typeface="Times New Roman" pitchFamily="18" charset="0"/>
+              </a:rPr>
+              <a:t>Implementation of PSO</a:t>
+            </a:r>
+            <a:endParaRPr lang="en-US" sz="3600" dirty="0">
+              <a:latin typeface="Times New Roman" pitchFamily="18" charset="0"/>
+              <a:cs typeface="Times New Roman" pitchFamily="18" charset="0"/>
+            </a:endParaRPr>
+          </a:p>
+        </p:txBody>
+      </p:sp>
+      <p:sp>
+        <p:nvSpPr>
+          <p:cNvPr id="3" name="Content Placeholder 2"/>
+          <p:cNvSpPr>
+            <a:spLocks noGrp="1"/>
+          </p:cNvSpPr>
+          <p:nvPr>
+            <p:ph idx="1"/>
+          </p:nvPr>
+        </p:nvSpPr>
+        <p:spPr/>
+        <p:txBody>
+          <a:bodyPr/>
+          <a:lstStyle/>
+          <a:p>
+            <a:endParaRPr lang="en-US" dirty="0"/>
+          </a:p>
+        </p:txBody>
+      </p:sp>
+    </p:spTree>
+    <p:extLst>
+      <p:ext uri="{BB962C8B-B14F-4D97-AF65-F5344CB8AC3E}">
+        <p14:creationId xmlns:p14="http://schemas.microsoft.com/office/powerpoint/2010/main" val="3472087063"/>
+      </p:ext>
+    </p:extLst>
+  </p:cSld>
+  <p:clrMapOvr>
+    <a:masterClrMapping/>
+  </p:clrMapOvr>
+</p:sld>
+</file>
+
+<file path=ppt/slides/slide8.xml><?xml version="1.0" encoding="utf-8"?>
+<p:sld xmlns:a="http://schemas.openxmlformats.org/drawingml/2006/main" xmlns:r="http://schemas.openxmlformats.org/officeDocument/2006/relationships" xmlns:p="http://schemas.openxmlformats.org/presentationml/2006/main">
+  <p:cSld>
+    <p:spTree>
+      <p:nvGrpSpPr>
+        <p:cNvPr id="1" name=""/>
+        <p:cNvGrpSpPr/>
+        <p:nvPr/>
+      </p:nvGrpSpPr>
+      <p:grpSpPr>
+        <a:xfrm>
+          <a:off x="0" y="0"/>
+          <a:ext cx="0" cy="0"/>
+          <a:chOff x="0" y="0"/>
+          <a:chExt cx="0" cy="0"/>
+        </a:xfrm>
+      </p:grpSpPr>
+      <p:sp>
+        <p:nvSpPr>
+          <p:cNvPr id="2" name="Title 1"/>
+          <p:cNvSpPr>
+            <a:spLocks noGrp="1"/>
+          </p:cNvSpPr>
+          <p:nvPr>
+            <p:ph type="title"/>
+          </p:nvPr>
+        </p:nvSpPr>
+        <p:spPr/>
+        <p:txBody>
+          <a:bodyPr>
+            <a:normAutofit/>
+          </a:bodyPr>
+          <a:lstStyle/>
+          <a:p>
+            <a:pPr algn="l"/>
+            <a:r>
+              <a:rPr lang="en-US" sz="3600" dirty="0" smtClean="0">
+                <a:latin typeface="Times New Roman" pitchFamily="18" charset="0"/>
+                <a:cs typeface="Times New Roman" pitchFamily="18" charset="0"/>
+              </a:rPr>
+              <a:t>Experimental Analysis </a:t>
+            </a:r>
+            <a:endParaRPr lang="en-US" sz="3600" dirty="0">
+              <a:latin typeface="Times New Roman" pitchFamily="18" charset="0"/>
+              <a:cs typeface="Times New Roman" pitchFamily="18" charset="0"/>
+            </a:endParaRPr>
+          </a:p>
+        </p:txBody>
+      </p:sp>
+      <p:sp>
+        <p:nvSpPr>
+          <p:cNvPr id="3" name="Content Placeholder 2"/>
+          <p:cNvSpPr>
+            <a:spLocks noGrp="1"/>
+          </p:cNvSpPr>
+          <p:nvPr>
+            <p:ph idx="1"/>
+          </p:nvPr>
+        </p:nvSpPr>
+        <p:spPr/>
+        <p:txBody>
+          <a:bodyPr/>
+          <a:lstStyle/>
+          <a:p>
+            <a:endParaRPr lang="en-US"/>
+          </a:p>
+        </p:txBody>
+      </p:sp>
+    </p:spTree>
+    <p:extLst>
+      <p:ext uri="{BB962C8B-B14F-4D97-AF65-F5344CB8AC3E}">
         <p14:creationId xmlns:p14="http://schemas.microsoft.com/office/powerpoint/2010/main" val="3488954058"/>
+      </p:ext>
+    </p:extLst>
+  </p:cSld>
+  <p:clrMapOvr>
+    <a:masterClrMapping/>
+  </p:clrMapOvr>
+</p:sld>
+</file>
+
+<file path=ppt/slides/slide9.xml><?xml version="1.0" encoding="utf-8"?>
+<p:sld xmlns:a="http://schemas.openxmlformats.org/drawingml/2006/main" xmlns:r="http://schemas.openxmlformats.org/officeDocument/2006/relationships" xmlns:p="http://schemas.openxmlformats.org/presentationml/2006/main">
+  <p:cSld>
+    <p:spTree>
+      <p:nvGrpSpPr>
+        <p:cNvPr id="1" name=""/>
+        <p:cNvGrpSpPr/>
+        <p:nvPr/>
+      </p:nvGrpSpPr>
+      <p:grpSpPr>
+        <a:xfrm>
+          <a:off x="0" y="0"/>
+          <a:ext cx="0" cy="0"/>
+          <a:chOff x="0" y="0"/>
+          <a:chExt cx="0" cy="0"/>
+        </a:xfrm>
+      </p:grpSpPr>
+      <p:sp>
+        <p:nvSpPr>
+          <p:cNvPr id="2" name="Title 1"/>
+          <p:cNvSpPr>
+            <a:spLocks noGrp="1"/>
+          </p:cNvSpPr>
+          <p:nvPr>
+            <p:ph type="title"/>
+          </p:nvPr>
+        </p:nvSpPr>
+        <p:spPr/>
+        <p:txBody>
+          <a:bodyPr/>
+          <a:lstStyle/>
+          <a:p>
+            <a:r>
+              <a:rPr lang="en-US" dirty="0" smtClean="0"/>
+              <a:t>References:</a:t>
+            </a:r>
+            <a:endParaRPr lang="en-GB" dirty="0"/>
+          </a:p>
+        </p:txBody>
+      </p:sp>
+      <p:sp>
+        <p:nvSpPr>
+          <p:cNvPr id="3" name="Content Placeholder 2"/>
+          <p:cNvSpPr>
+            <a:spLocks noGrp="1"/>
+          </p:cNvSpPr>
+          <p:nvPr>
+            <p:ph idx="1"/>
+          </p:nvPr>
+        </p:nvSpPr>
+        <p:spPr/>
+        <p:txBody>
+          <a:bodyPr>
+            <a:normAutofit/>
+          </a:bodyPr>
+          <a:lstStyle/>
+          <a:p>
+            <a:r>
+              <a:rPr lang="en-GB" sz="1600" dirty="0">
+                <a:hlinkClick r:id="rId2"/>
+              </a:rPr>
+              <a:t>https://</a:t>
+            </a:r>
+            <a:r>
+              <a:rPr lang="en-GB" sz="1600" dirty="0" smtClean="0">
+                <a:hlinkClick r:id="rId2"/>
+              </a:rPr>
+              <a:t>www.researchgate.net/figure/The-pseudocode-of-the-PSO-algorithm_fig8_274460300</a:t>
+            </a:r>
+            <a:endParaRPr lang="en-GB" sz="1600" dirty="0">
+              <a:hlinkClick r:id="rId2"/>
+            </a:endParaRPr>
+          </a:p>
+          <a:p>
+            <a:r>
+              <a:rPr lang="en-GB" sz="1600" dirty="0">
+                <a:hlinkClick r:id="rId3"/>
+              </a:rPr>
+              <a:t>https://www.hindawi.com/journals/tswj/2014/973093/fig1/</a:t>
+            </a:r>
+            <a:endParaRPr lang="en-GB" sz="1600" dirty="0"/>
+          </a:p>
+        </p:txBody>
+      </p:sp>
+    </p:spTree>
+    <p:extLst>
+      <p:ext uri="{BB962C8B-B14F-4D97-AF65-F5344CB8AC3E}">
+        <p14:creationId xmlns:p14="http://schemas.microsoft.com/office/powerpoint/2010/main" val="683885463"/>
       </p:ext>
     </p:extLst>
   </p:cSld>

</xml_diff>

<commit_message>
How it works? (Equations added and revised function)
</commit_message>
<xml_diff>
--- a/Documentation/Presentation (interim demo).pptx
+++ b/Documentation/Presentation (interim demo).pptx
@@ -7,14 +7,16 @@
   <p:sldIdLst>
     <p:sldId id="256" r:id="rId2"/>
     <p:sldId id="257" r:id="rId3"/>
-    <p:sldId id="264" r:id="rId4"/>
-    <p:sldId id="262" r:id="rId5"/>
-    <p:sldId id="258" r:id="rId6"/>
-    <p:sldId id="265" r:id="rId7"/>
-    <p:sldId id="259" r:id="rId8"/>
-    <p:sldId id="261" r:id="rId9"/>
-    <p:sldId id="260" r:id="rId10"/>
-    <p:sldId id="263" r:id="rId11"/>
+    <p:sldId id="258" r:id="rId4"/>
+    <p:sldId id="265" r:id="rId5"/>
+    <p:sldId id="266" r:id="rId6"/>
+    <p:sldId id="267" r:id="rId7"/>
+    <p:sldId id="264" r:id="rId8"/>
+    <p:sldId id="262" r:id="rId9"/>
+    <p:sldId id="259" r:id="rId10"/>
+    <p:sldId id="261" r:id="rId11"/>
+    <p:sldId id="260" r:id="rId12"/>
+    <p:sldId id="263" r:id="rId13"/>
   </p:sldIdLst>
   <p:sldSz cx="9144000" cy="6858000" type="screen4x3"/>
   <p:notesSz cx="6858000" cy="9144000"/>
@@ -115,7 +117,7 @@
   </p:defaultTextStyle>
   <p:extLst>
     <p:ext uri="{EFAFB233-063F-42B5-8137-9DF3F51BA10A}">
-      <p15:sldGuideLst xmlns:p15="http://schemas.microsoft.com/office/powerpoint/2012/main">
+      <p15:sldGuideLst xmlns:p15="http://schemas.microsoft.com/office/powerpoint/2012/main" xmlns="">
         <p15:guide id="1" orient="horz" pos="2160">
           <p15:clr>
             <a:srgbClr val="A4A3A4"/>
@@ -3402,6 +3404,168 @@
         </p:nvSpPr>
         <p:spPr/>
         <p:txBody>
+          <a:bodyPr>
+            <a:normAutofit/>
+          </a:bodyPr>
+          <a:lstStyle/>
+          <a:p>
+            <a:pPr algn="l"/>
+            <a:r>
+              <a:rPr lang="en-US" sz="3600" dirty="0" smtClean="0">
+                <a:latin typeface="Times New Roman" pitchFamily="18" charset="0"/>
+                <a:cs typeface="Times New Roman" pitchFamily="18" charset="0"/>
+              </a:rPr>
+              <a:t>Implementation of PSO</a:t>
+            </a:r>
+            <a:endParaRPr lang="en-US" sz="3600" dirty="0">
+              <a:latin typeface="Times New Roman" pitchFamily="18" charset="0"/>
+              <a:cs typeface="Times New Roman" pitchFamily="18" charset="0"/>
+            </a:endParaRPr>
+          </a:p>
+        </p:txBody>
+      </p:sp>
+      <p:sp>
+        <p:nvSpPr>
+          <p:cNvPr id="3" name="Content Placeholder 2"/>
+          <p:cNvSpPr>
+            <a:spLocks noGrp="1"/>
+          </p:cNvSpPr>
+          <p:nvPr>
+            <p:ph idx="1"/>
+          </p:nvPr>
+        </p:nvSpPr>
+        <p:spPr/>
+        <p:txBody>
+          <a:bodyPr/>
+          <a:lstStyle/>
+          <a:p>
+            <a:endParaRPr lang="en-US" dirty="0"/>
+          </a:p>
+        </p:txBody>
+      </p:sp>
+    </p:spTree>
+    <p:extLst>
+      <p:ext uri="{BB962C8B-B14F-4D97-AF65-F5344CB8AC3E}">
+        <p14:creationId xmlns:p14="http://schemas.microsoft.com/office/powerpoint/2010/main" val="3472087063"/>
+      </p:ext>
+    </p:extLst>
+  </p:cSld>
+  <p:clrMapOvr>
+    <a:masterClrMapping/>
+  </p:clrMapOvr>
+</p:sld>
+</file>
+
+<file path=ppt/slides/slide11.xml><?xml version="1.0" encoding="utf-8"?>
+<p:sld xmlns:a="http://schemas.openxmlformats.org/drawingml/2006/main" xmlns:r="http://schemas.openxmlformats.org/officeDocument/2006/relationships" xmlns:p="http://schemas.openxmlformats.org/presentationml/2006/main">
+  <p:cSld>
+    <p:spTree>
+      <p:nvGrpSpPr>
+        <p:cNvPr id="1" name=""/>
+        <p:cNvGrpSpPr/>
+        <p:nvPr/>
+      </p:nvGrpSpPr>
+      <p:grpSpPr>
+        <a:xfrm>
+          <a:off x="0" y="0"/>
+          <a:ext cx="0" cy="0"/>
+          <a:chOff x="0" y="0"/>
+          <a:chExt cx="0" cy="0"/>
+        </a:xfrm>
+      </p:grpSpPr>
+      <p:sp>
+        <p:nvSpPr>
+          <p:cNvPr id="2" name="Title 1"/>
+          <p:cNvSpPr>
+            <a:spLocks noGrp="1"/>
+          </p:cNvSpPr>
+          <p:nvPr>
+            <p:ph type="title"/>
+          </p:nvPr>
+        </p:nvSpPr>
+        <p:spPr/>
+        <p:txBody>
+          <a:bodyPr>
+            <a:normAutofit/>
+          </a:bodyPr>
+          <a:lstStyle/>
+          <a:p>
+            <a:pPr algn="l"/>
+            <a:r>
+              <a:rPr lang="en-US" sz="3600" dirty="0" smtClean="0">
+                <a:latin typeface="Times New Roman" pitchFamily="18" charset="0"/>
+                <a:cs typeface="Times New Roman" pitchFamily="18" charset="0"/>
+              </a:rPr>
+              <a:t>Experimental Analysis </a:t>
+            </a:r>
+            <a:endParaRPr lang="en-US" sz="3600" dirty="0">
+              <a:latin typeface="Times New Roman" pitchFamily="18" charset="0"/>
+              <a:cs typeface="Times New Roman" pitchFamily="18" charset="0"/>
+            </a:endParaRPr>
+          </a:p>
+        </p:txBody>
+      </p:sp>
+      <p:sp>
+        <p:nvSpPr>
+          <p:cNvPr id="3" name="Content Placeholder 2"/>
+          <p:cNvSpPr>
+            <a:spLocks noGrp="1"/>
+          </p:cNvSpPr>
+          <p:nvPr>
+            <p:ph idx="1"/>
+          </p:nvPr>
+        </p:nvSpPr>
+        <p:spPr/>
+        <p:txBody>
+          <a:bodyPr/>
+          <a:lstStyle/>
+          <a:p>
+            <a:endParaRPr lang="en-US"/>
+          </a:p>
+        </p:txBody>
+      </p:sp>
+    </p:spTree>
+    <p:extLst>
+      <p:ext uri="{BB962C8B-B14F-4D97-AF65-F5344CB8AC3E}">
+        <p14:creationId xmlns:p14="http://schemas.microsoft.com/office/powerpoint/2010/main" val="3488954058"/>
+      </p:ext>
+    </p:extLst>
+  </p:cSld>
+  <p:clrMapOvr>
+    <a:masterClrMapping/>
+  </p:clrMapOvr>
+</p:sld>
+</file>
+
+<file path=ppt/slides/slide12.xml><?xml version="1.0" encoding="utf-8"?>
+<p:sld xmlns:a="http://schemas.openxmlformats.org/drawingml/2006/main" xmlns:r="http://schemas.openxmlformats.org/officeDocument/2006/relationships" xmlns:p="http://schemas.openxmlformats.org/presentationml/2006/main">
+  <p:cSld>
+    <p:spTree>
+      <p:nvGrpSpPr>
+        <p:cNvPr id="1" name=""/>
+        <p:cNvGrpSpPr/>
+        <p:nvPr/>
+      </p:nvGrpSpPr>
+      <p:grpSpPr>
+        <a:xfrm>
+          <a:off x="0" y="0"/>
+          <a:ext cx="0" cy="0"/>
+          <a:chOff x="0" y="0"/>
+          <a:chExt cx="0" cy="0"/>
+        </a:xfrm>
+      </p:grpSpPr>
+      <p:sp>
+        <p:nvSpPr>
+          <p:cNvPr id="2" name="Title 1"/>
+          <p:cNvSpPr>
+            <a:spLocks noGrp="1"/>
+          </p:cNvSpPr>
+          <p:nvPr>
+            <p:ph type="title"/>
+          </p:nvPr>
+        </p:nvSpPr>
+        <p:spPr/>
+        <p:txBody>
           <a:bodyPr/>
           <a:lstStyle/>
           <a:p>
@@ -3721,6 +3885,787 @@
 </file>
 
 <file path=ppt/slides/slide3.xml><?xml version="1.0" encoding="utf-8"?>
+<p:sld xmlns:a="http://schemas.openxmlformats.org/drawingml/2006/main" xmlns:r="http://schemas.openxmlformats.org/officeDocument/2006/relationships" xmlns:p="http://schemas.openxmlformats.org/presentationml/2006/main">
+  <p:cSld>
+    <p:spTree>
+      <p:nvGrpSpPr>
+        <p:cNvPr id="1" name=""/>
+        <p:cNvGrpSpPr/>
+        <p:nvPr/>
+      </p:nvGrpSpPr>
+      <p:grpSpPr>
+        <a:xfrm>
+          <a:off x="0" y="0"/>
+          <a:ext cx="0" cy="0"/>
+          <a:chOff x="0" y="0"/>
+          <a:chExt cx="0" cy="0"/>
+        </a:xfrm>
+      </p:grpSpPr>
+      <p:sp>
+        <p:nvSpPr>
+          <p:cNvPr id="2" name="Title 1"/>
+          <p:cNvSpPr>
+            <a:spLocks noGrp="1"/>
+          </p:cNvSpPr>
+          <p:nvPr>
+            <p:ph type="title"/>
+          </p:nvPr>
+        </p:nvSpPr>
+        <p:spPr/>
+        <p:txBody>
+          <a:bodyPr>
+            <a:normAutofit fontScale="90000"/>
+          </a:bodyPr>
+          <a:lstStyle/>
+          <a:p>
+            <a:r>
+              <a:rPr lang="en-US" sz="3600" dirty="0" smtClean="0">
+                <a:latin typeface="Times New Roman" pitchFamily="18" charset="0"/>
+                <a:cs typeface="Times New Roman" pitchFamily="18" charset="0"/>
+              </a:rPr>
+              <a:t>Important concepts and functions in PSO. (</a:t>
+            </a:r>
+            <a:r>
+              <a:rPr lang="en-US" sz="3600" dirty="0" smtClean="0">
+                <a:latin typeface="Times New Roman" pitchFamily="18" charset="0"/>
+                <a:cs typeface="Times New Roman" pitchFamily="18" charset="0"/>
+              </a:rPr>
+              <a:t>1/4)</a:t>
+            </a:r>
+            <a:endParaRPr lang="en-US" sz="3600" dirty="0">
+              <a:latin typeface="Times New Roman" pitchFamily="18" charset="0"/>
+              <a:cs typeface="Times New Roman" pitchFamily="18" charset="0"/>
+            </a:endParaRPr>
+          </a:p>
+        </p:txBody>
+      </p:sp>
+      <p:sp>
+        <p:nvSpPr>
+          <p:cNvPr id="3" name="Content Placeholder 2"/>
+          <p:cNvSpPr>
+            <a:spLocks noGrp="1"/>
+          </p:cNvSpPr>
+          <p:nvPr>
+            <p:ph idx="1"/>
+          </p:nvPr>
+        </p:nvSpPr>
+        <p:spPr/>
+        <p:txBody>
+          <a:bodyPr>
+            <a:normAutofit/>
+          </a:bodyPr>
+          <a:lstStyle/>
+          <a:p>
+            <a:pPr marL="114300" indent="0">
+              <a:buNone/>
+            </a:pPr>
+            <a:r>
+              <a:rPr lang="en-US" sz="2400" b="1" u="sng" dirty="0" smtClean="0">
+                <a:latin typeface="Times New Roman" pitchFamily="18" charset="0"/>
+                <a:cs typeface="Times New Roman" pitchFamily="18" charset="0"/>
+              </a:rPr>
+              <a:t>Concepts:</a:t>
+            </a:r>
+            <a:r>
+              <a:rPr lang="en-US" sz="2400" dirty="0" smtClean="0">
+                <a:latin typeface="Times New Roman" pitchFamily="18" charset="0"/>
+                <a:cs typeface="Times New Roman" pitchFamily="18" charset="0"/>
+              </a:rPr>
+              <a:t> </a:t>
+            </a:r>
+            <a:endParaRPr lang="en-US" sz="2400" dirty="0">
+              <a:latin typeface="Times New Roman" pitchFamily="18" charset="0"/>
+              <a:cs typeface="Times New Roman" pitchFamily="18" charset="0"/>
+            </a:endParaRPr>
+          </a:p>
+          <a:p>
+            <a:r>
+              <a:rPr lang="en-US" sz="2400" dirty="0">
+                <a:latin typeface="Times New Roman" pitchFamily="18" charset="0"/>
+                <a:cs typeface="Times New Roman" pitchFamily="18" charset="0"/>
+              </a:rPr>
+              <a:t>As it is a population based method, it works iteratively until the terminal point is reached </a:t>
+            </a:r>
+          </a:p>
+          <a:p>
+            <a:r>
+              <a:rPr lang="en-US" sz="2400" dirty="0">
+                <a:latin typeface="Times New Roman" pitchFamily="18" charset="0"/>
+                <a:cs typeface="Times New Roman" pitchFamily="18" charset="0"/>
+              </a:rPr>
+              <a:t>Uses many particles (referred to as swarm) which are moving in search for best solution </a:t>
+            </a:r>
+          </a:p>
+          <a:p>
+            <a:r>
+              <a:rPr lang="en-US" sz="2400" dirty="0">
+                <a:latin typeface="Times New Roman" pitchFamily="18" charset="0"/>
+                <a:cs typeface="Times New Roman" pitchFamily="18" charset="0"/>
+              </a:rPr>
+              <a:t>Each particle has its fitness value which is evaluated by the fitness function </a:t>
+            </a:r>
+          </a:p>
+          <a:p>
+            <a:r>
+              <a:rPr lang="en-US" sz="2400" dirty="0">
+                <a:latin typeface="Times New Roman" pitchFamily="18" charset="0"/>
+                <a:cs typeface="Times New Roman" pitchFamily="18" charset="0"/>
+              </a:rPr>
+              <a:t>All the particle has certain velocities which directs the flying of the particles </a:t>
+            </a:r>
+          </a:p>
+          <a:p>
+            <a:r>
+              <a:rPr lang="en-US" sz="2400" dirty="0">
+                <a:latin typeface="Times New Roman" pitchFamily="18" charset="0"/>
+                <a:cs typeface="Times New Roman" pitchFamily="18" charset="0"/>
+              </a:rPr>
+              <a:t>Particles fly through the space by following the current optimum particles</a:t>
+            </a:r>
+          </a:p>
+        </p:txBody>
+      </p:sp>
+    </p:spTree>
+    <p:extLst>
+      <p:ext uri="{BB962C8B-B14F-4D97-AF65-F5344CB8AC3E}">
+        <p14:creationId xmlns:p14="http://schemas.microsoft.com/office/powerpoint/2010/main" val="3792755165"/>
+      </p:ext>
+    </p:extLst>
+  </p:cSld>
+  <p:clrMapOvr>
+    <a:masterClrMapping/>
+  </p:clrMapOvr>
+</p:sld>
+</file>
+
+<file path=ppt/slides/slide4.xml><?xml version="1.0" encoding="utf-8"?>
+<p:sld xmlns:a="http://schemas.openxmlformats.org/drawingml/2006/main" xmlns:r="http://schemas.openxmlformats.org/officeDocument/2006/relationships" xmlns:p="http://schemas.openxmlformats.org/presentationml/2006/main">
+  <p:cSld>
+    <p:spTree>
+      <p:nvGrpSpPr>
+        <p:cNvPr id="1" name=""/>
+        <p:cNvGrpSpPr/>
+        <p:nvPr/>
+      </p:nvGrpSpPr>
+      <p:grpSpPr>
+        <a:xfrm>
+          <a:off x="0" y="0"/>
+          <a:ext cx="0" cy="0"/>
+          <a:chOff x="0" y="0"/>
+          <a:chExt cx="0" cy="0"/>
+        </a:xfrm>
+      </p:grpSpPr>
+      <p:sp>
+        <p:nvSpPr>
+          <p:cNvPr id="2" name="Title 1"/>
+          <p:cNvSpPr>
+            <a:spLocks noGrp="1"/>
+          </p:cNvSpPr>
+          <p:nvPr>
+            <p:ph type="title"/>
+          </p:nvPr>
+        </p:nvSpPr>
+        <p:spPr/>
+        <p:txBody>
+          <a:bodyPr/>
+          <a:lstStyle/>
+          <a:p>
+            <a:r>
+              <a:rPr lang="en-US" sz="3200" dirty="0">
+                <a:latin typeface="Times New Roman" pitchFamily="18" charset="0"/>
+                <a:cs typeface="Times New Roman" pitchFamily="18" charset="0"/>
+              </a:rPr>
+              <a:t>Important concepts and functions in PSO. </a:t>
+            </a:r>
+            <a:r>
+              <a:rPr lang="en-US" sz="3200" dirty="0" smtClean="0">
+                <a:latin typeface="Times New Roman" pitchFamily="18" charset="0"/>
+                <a:cs typeface="Times New Roman" pitchFamily="18" charset="0"/>
+              </a:rPr>
+              <a:t>(2/4)</a:t>
+            </a:r>
+            <a:endParaRPr lang="en-US" sz="3200" dirty="0"/>
+          </a:p>
+        </p:txBody>
+      </p:sp>
+      <p:sp>
+        <p:nvSpPr>
+          <p:cNvPr id="3" name="Content Placeholder 2"/>
+          <p:cNvSpPr>
+            <a:spLocks noGrp="1"/>
+          </p:cNvSpPr>
+          <p:nvPr>
+            <p:ph idx="1"/>
+          </p:nvPr>
+        </p:nvSpPr>
+        <p:spPr>
+          <a:xfrm>
+            <a:off x="457200" y="1295400"/>
+            <a:ext cx="7620000" cy="5105400"/>
+          </a:xfrm>
+        </p:spPr>
+        <p:txBody>
+          <a:bodyPr>
+            <a:normAutofit/>
+          </a:bodyPr>
+          <a:lstStyle/>
+          <a:p>
+            <a:pPr marL="114300" indent="0">
+              <a:buNone/>
+            </a:pPr>
+            <a:r>
+              <a:rPr lang="en-US" sz="2400" b="1" u="sng" dirty="0">
+                <a:latin typeface="Times New Roman" pitchFamily="18" charset="0"/>
+                <a:cs typeface="Times New Roman" pitchFamily="18" charset="0"/>
+              </a:rPr>
+              <a:t>How does it </a:t>
+            </a:r>
+            <a:r>
+              <a:rPr lang="en-US" sz="2400" b="1" u="sng" dirty="0" smtClean="0">
+                <a:latin typeface="Times New Roman" pitchFamily="18" charset="0"/>
+                <a:cs typeface="Times New Roman" pitchFamily="18" charset="0"/>
+              </a:rPr>
+              <a:t>work or functions?</a:t>
+            </a:r>
+          </a:p>
+          <a:p>
+            <a:r>
+              <a:rPr lang="en-US" sz="2400" dirty="0">
+                <a:latin typeface="Times New Roman" pitchFamily="18" charset="0"/>
+                <a:cs typeface="Times New Roman" pitchFamily="18" charset="0"/>
+              </a:rPr>
+              <a:t>Basic algorithm as proposed by Kennedy and </a:t>
+            </a:r>
+            <a:r>
+              <a:rPr lang="en-US" sz="2400" dirty="0" err="1">
+                <a:latin typeface="Times New Roman" pitchFamily="18" charset="0"/>
+                <a:cs typeface="Times New Roman" pitchFamily="18" charset="0"/>
+              </a:rPr>
+              <a:t>Eberhart</a:t>
+            </a:r>
+            <a:r>
+              <a:rPr lang="en-US" sz="2400" dirty="0">
+                <a:latin typeface="Times New Roman" pitchFamily="18" charset="0"/>
+                <a:cs typeface="Times New Roman" pitchFamily="18" charset="0"/>
+              </a:rPr>
+              <a:t> (1995</a:t>
+            </a:r>
+            <a:r>
+              <a:rPr lang="en-US" sz="2400" dirty="0" smtClean="0">
+                <a:latin typeface="Times New Roman" pitchFamily="18" charset="0"/>
+                <a:cs typeface="Times New Roman" pitchFamily="18" charset="0"/>
+              </a:rPr>
+              <a:t>)</a:t>
+            </a:r>
+            <a:endParaRPr lang="en-US" sz="2400" b="1" u="sng" dirty="0" smtClean="0">
+              <a:latin typeface="Times New Roman" pitchFamily="18" charset="0"/>
+              <a:cs typeface="Times New Roman" pitchFamily="18" charset="0"/>
+            </a:endParaRPr>
+          </a:p>
+          <a:p>
+            <a:pPr lvl="1"/>
+            <a:r>
+              <a:rPr lang="en-US" sz="2400" dirty="0" smtClean="0">
+                <a:latin typeface="Times New Roman" pitchFamily="18" charset="0"/>
+                <a:cs typeface="Times New Roman" pitchFamily="18" charset="0"/>
+              </a:rPr>
+              <a:t>It </a:t>
+            </a:r>
+            <a:r>
+              <a:rPr lang="en-US" sz="2400" dirty="0" smtClean="0">
+                <a:latin typeface="Times New Roman" pitchFamily="18" charset="0"/>
+                <a:cs typeface="Times New Roman" pitchFamily="18" charset="0"/>
+              </a:rPr>
+              <a:t>starts with a group of random </a:t>
+            </a:r>
+            <a:r>
+              <a:rPr lang="en-US" sz="2400" dirty="0" smtClean="0">
+                <a:latin typeface="Times New Roman" pitchFamily="18" charset="0"/>
+                <a:cs typeface="Times New Roman" pitchFamily="18" charset="0"/>
+              </a:rPr>
+              <a:t>particles.</a:t>
+            </a:r>
+            <a:endParaRPr lang="en-US" sz="2400" dirty="0" smtClean="0">
+              <a:latin typeface="Times New Roman" pitchFamily="18" charset="0"/>
+              <a:cs typeface="Times New Roman" pitchFamily="18" charset="0"/>
+            </a:endParaRPr>
+          </a:p>
+          <a:p>
+            <a:pPr lvl="1"/>
+            <a:r>
+              <a:rPr lang="en-US" sz="2400" dirty="0" smtClean="0">
+                <a:latin typeface="Times New Roman" pitchFamily="18" charset="0"/>
+                <a:cs typeface="Times New Roman" pitchFamily="18" charset="0"/>
+              </a:rPr>
+              <a:t>Searches for the optimal value by updating </a:t>
+            </a:r>
+            <a:r>
+              <a:rPr lang="en-US" sz="2400" dirty="0" smtClean="0">
+                <a:latin typeface="Times New Roman" pitchFamily="18" charset="0"/>
+                <a:cs typeface="Times New Roman" pitchFamily="18" charset="0"/>
+              </a:rPr>
+              <a:t>generations.</a:t>
+            </a:r>
+            <a:endParaRPr lang="en-US" sz="2400" dirty="0" smtClean="0">
+              <a:latin typeface="Times New Roman" pitchFamily="18" charset="0"/>
+              <a:cs typeface="Times New Roman" pitchFamily="18" charset="0"/>
+            </a:endParaRPr>
+          </a:p>
+          <a:p>
+            <a:pPr lvl="1"/>
+            <a:r>
+              <a:rPr lang="en-US" sz="2400" dirty="0" smtClean="0">
+                <a:latin typeface="Times New Roman" pitchFamily="18" charset="0"/>
+                <a:cs typeface="Times New Roman" pitchFamily="18" charset="0"/>
+              </a:rPr>
+              <a:t>Particles move in the solution space and are evaluated according to a fitness </a:t>
+            </a:r>
+            <a:r>
+              <a:rPr lang="en-US" sz="2400" dirty="0" smtClean="0">
+                <a:latin typeface="Times New Roman" pitchFamily="18" charset="0"/>
+                <a:cs typeface="Times New Roman" pitchFamily="18" charset="0"/>
+              </a:rPr>
+              <a:t>criteria.</a:t>
+            </a:r>
+            <a:endParaRPr lang="en-US" sz="2400" dirty="0" smtClean="0">
+              <a:latin typeface="Times New Roman" pitchFamily="18" charset="0"/>
+              <a:cs typeface="Times New Roman" pitchFamily="18" charset="0"/>
+            </a:endParaRPr>
+          </a:p>
+          <a:p>
+            <a:pPr lvl="1"/>
+            <a:r>
+              <a:rPr lang="en-US" sz="2400" dirty="0" smtClean="0">
+                <a:latin typeface="Times New Roman" pitchFamily="18" charset="0"/>
+                <a:cs typeface="Times New Roman" pitchFamily="18" charset="0"/>
+              </a:rPr>
+              <a:t>After every iteration, the "best" values of each particle is updated </a:t>
+            </a:r>
+            <a:r>
+              <a:rPr lang="en-US" sz="2400" dirty="0" smtClean="0">
+                <a:latin typeface="Times New Roman" pitchFamily="18" charset="0"/>
+                <a:cs typeface="Times New Roman" pitchFamily="18" charset="0"/>
+              </a:rPr>
+              <a:t>i.e.</a:t>
+            </a:r>
+          </a:p>
+          <a:p>
+            <a:pPr lvl="2"/>
+            <a:r>
+              <a:rPr lang="en-US" sz="2400" dirty="0" smtClean="0">
+                <a:latin typeface="Times New Roman" pitchFamily="18" charset="0"/>
+                <a:cs typeface="Times New Roman" pitchFamily="18" charset="0"/>
+              </a:rPr>
+              <a:t> </a:t>
+            </a:r>
+            <a:r>
+              <a:rPr lang="en-US" sz="2400" dirty="0" err="1" smtClean="0">
+                <a:latin typeface="Times New Roman" pitchFamily="18" charset="0"/>
+                <a:cs typeface="Times New Roman" pitchFamily="18" charset="0"/>
+              </a:rPr>
+              <a:t>Pbest</a:t>
+            </a:r>
+            <a:r>
+              <a:rPr lang="en-US" sz="2400" dirty="0" smtClean="0">
+                <a:latin typeface="Times New Roman" pitchFamily="18" charset="0"/>
+                <a:cs typeface="Times New Roman" pitchFamily="18" charset="0"/>
+              </a:rPr>
+              <a:t> (personal best) </a:t>
+            </a:r>
+            <a:endParaRPr lang="en-US" sz="2400" dirty="0">
+              <a:latin typeface="Times New Roman" pitchFamily="18" charset="0"/>
+              <a:cs typeface="Times New Roman" pitchFamily="18" charset="0"/>
+            </a:endParaRPr>
+          </a:p>
+          <a:p>
+            <a:pPr lvl="2"/>
+            <a:r>
+              <a:rPr lang="en-US" sz="2400" dirty="0" err="1">
+                <a:latin typeface="Times New Roman" pitchFamily="18" charset="0"/>
+                <a:cs typeface="Times New Roman" pitchFamily="18" charset="0"/>
+              </a:rPr>
+              <a:t>G</a:t>
+            </a:r>
+            <a:r>
+              <a:rPr lang="en-US" sz="2400" dirty="0" err="1" smtClean="0">
+                <a:latin typeface="Times New Roman" pitchFamily="18" charset="0"/>
+                <a:cs typeface="Times New Roman" pitchFamily="18" charset="0"/>
+              </a:rPr>
+              <a:t>best</a:t>
+            </a:r>
+            <a:r>
+              <a:rPr lang="en-US" sz="2400" dirty="0" smtClean="0">
+                <a:latin typeface="Times New Roman" pitchFamily="18" charset="0"/>
+                <a:cs typeface="Times New Roman" pitchFamily="18" charset="0"/>
+              </a:rPr>
+              <a:t> </a:t>
+            </a:r>
+            <a:r>
+              <a:rPr lang="en-US" sz="2400" dirty="0" smtClean="0">
+                <a:latin typeface="Times New Roman" pitchFamily="18" charset="0"/>
+                <a:cs typeface="Times New Roman" pitchFamily="18" charset="0"/>
+              </a:rPr>
+              <a:t>(global best)</a:t>
+            </a:r>
+          </a:p>
+          <a:p>
+            <a:endParaRPr lang="en-US" sz="2400" b="1" u="sng" dirty="0" smtClean="0">
+              <a:latin typeface="Times New Roman" pitchFamily="18" charset="0"/>
+              <a:cs typeface="Times New Roman" pitchFamily="18" charset="0"/>
+            </a:endParaRPr>
+          </a:p>
+          <a:p>
+            <a:pPr marL="114300" indent="0">
+              <a:buNone/>
+            </a:pPr>
+            <a:endParaRPr lang="en-US" sz="2400" b="1" u="sng" dirty="0">
+              <a:latin typeface="Times New Roman" pitchFamily="18" charset="0"/>
+              <a:cs typeface="Times New Roman" pitchFamily="18" charset="0"/>
+            </a:endParaRPr>
+          </a:p>
+        </p:txBody>
+      </p:sp>
+    </p:spTree>
+    <p:extLst>
+      <p:ext uri="{BB962C8B-B14F-4D97-AF65-F5344CB8AC3E}">
+        <p14:creationId xmlns:p14="http://schemas.microsoft.com/office/powerpoint/2010/main" val="828917097"/>
+      </p:ext>
+    </p:extLst>
+  </p:cSld>
+  <p:clrMapOvr>
+    <a:masterClrMapping/>
+  </p:clrMapOvr>
+</p:sld>
+</file>
+
+<file path=ppt/slides/slide5.xml><?xml version="1.0" encoding="utf-8"?>
+<p:sld xmlns:a="http://schemas.openxmlformats.org/drawingml/2006/main" xmlns:r="http://schemas.openxmlformats.org/officeDocument/2006/relationships" xmlns:p="http://schemas.openxmlformats.org/presentationml/2006/main">
+  <p:cSld>
+    <p:spTree>
+      <p:nvGrpSpPr>
+        <p:cNvPr id="1" name=""/>
+        <p:cNvGrpSpPr/>
+        <p:nvPr/>
+      </p:nvGrpSpPr>
+      <p:grpSpPr>
+        <a:xfrm>
+          <a:off x="0" y="0"/>
+          <a:ext cx="0" cy="0"/>
+          <a:chOff x="0" y="0"/>
+          <a:chExt cx="0" cy="0"/>
+        </a:xfrm>
+      </p:grpSpPr>
+      <p:sp>
+        <p:nvSpPr>
+          <p:cNvPr id="2" name="Title 1"/>
+          <p:cNvSpPr>
+            <a:spLocks noGrp="1"/>
+          </p:cNvSpPr>
+          <p:nvPr>
+            <p:ph type="title"/>
+          </p:nvPr>
+        </p:nvSpPr>
+        <p:spPr/>
+        <p:txBody>
+          <a:bodyPr/>
+          <a:lstStyle/>
+          <a:p>
+            <a:r>
+              <a:rPr lang="en-US" sz="3200" dirty="0">
+                <a:latin typeface="Times New Roman" pitchFamily="18" charset="0"/>
+                <a:cs typeface="Times New Roman" pitchFamily="18" charset="0"/>
+              </a:rPr>
+              <a:t>Important concepts and functions in PSO. </a:t>
+            </a:r>
+            <a:r>
+              <a:rPr lang="en-US" sz="3200" dirty="0" smtClean="0">
+                <a:latin typeface="Times New Roman" pitchFamily="18" charset="0"/>
+                <a:cs typeface="Times New Roman" pitchFamily="18" charset="0"/>
+              </a:rPr>
+              <a:t>(3/4)</a:t>
+            </a:r>
+            <a:endParaRPr lang="en-US" sz="3200" dirty="0">
+              <a:latin typeface="Times New Roman" pitchFamily="18" charset="0"/>
+              <a:cs typeface="Times New Roman" pitchFamily="18" charset="0"/>
+            </a:endParaRPr>
+          </a:p>
+        </p:txBody>
+      </p:sp>
+      <p:sp>
+        <p:nvSpPr>
+          <p:cNvPr id="3" name="Content Placeholder 2"/>
+          <p:cNvSpPr>
+            <a:spLocks noGrp="1"/>
+          </p:cNvSpPr>
+          <p:nvPr>
+            <p:ph idx="1"/>
+          </p:nvPr>
+        </p:nvSpPr>
+        <p:spPr/>
+        <p:txBody>
+          <a:bodyPr/>
+          <a:lstStyle/>
+          <a:p>
+            <a:r>
+              <a:rPr lang="en-US" sz="2400" dirty="0" smtClean="0">
+                <a:latin typeface="Times New Roman" pitchFamily="18" charset="0"/>
+                <a:cs typeface="Times New Roman" pitchFamily="18" charset="0"/>
+              </a:rPr>
+              <a:t>Some basic equations:</a:t>
+            </a:r>
+          </a:p>
+          <a:p>
+            <a:pPr lvl="1"/>
+            <a:r>
+              <a:rPr lang="en-US" sz="2400" dirty="0" smtClean="0">
+                <a:latin typeface="Times New Roman" pitchFamily="18" charset="0"/>
+                <a:cs typeface="Times New Roman" pitchFamily="18" charset="0"/>
+              </a:rPr>
+              <a:t>Position of individual particles updated as follows:</a:t>
+            </a:r>
+          </a:p>
+          <a:p>
+            <a:pPr lvl="1"/>
+            <a:endParaRPr lang="en-US" dirty="0">
+              <a:latin typeface="Times New Roman" pitchFamily="18" charset="0"/>
+              <a:cs typeface="Times New Roman" pitchFamily="18" charset="0"/>
+            </a:endParaRPr>
+          </a:p>
+          <a:p>
+            <a:pPr marL="411480" lvl="1" indent="0">
+              <a:buNone/>
+            </a:pPr>
+            <a:endParaRPr lang="en-US" dirty="0" smtClean="0">
+              <a:latin typeface="Times New Roman" pitchFamily="18" charset="0"/>
+              <a:cs typeface="Times New Roman" pitchFamily="18" charset="0"/>
+            </a:endParaRPr>
+          </a:p>
+          <a:p>
+            <a:pPr lvl="1"/>
+            <a:r>
+              <a:rPr lang="en-US" sz="2400" dirty="0" smtClean="0">
+                <a:latin typeface="Times New Roman" pitchFamily="18" charset="0"/>
+                <a:cs typeface="Times New Roman" pitchFamily="18" charset="0"/>
+              </a:rPr>
+              <a:t>With the velocity calculated as follows:</a:t>
+            </a:r>
+            <a:endParaRPr lang="en-US" sz="2400" dirty="0">
+              <a:latin typeface="Times New Roman" pitchFamily="18" charset="0"/>
+              <a:cs typeface="Times New Roman" pitchFamily="18" charset="0"/>
+            </a:endParaRPr>
+          </a:p>
+        </p:txBody>
+      </p:sp>
+      <p:pic>
+        <p:nvPicPr>
+          <p:cNvPr id="5" name="Picture 4"/>
+          <p:cNvPicPr>
+            <a:picLocks noChangeAspect="1"/>
+          </p:cNvPicPr>
+          <p:nvPr/>
+        </p:nvPicPr>
+        <p:blipFill rotWithShape="1">
+          <a:blip r:embed="rId2">
+            <a:extLst>
+              <a:ext uri="{28A0092B-C50C-407E-A947-70E740481C1C}">
+                <a14:useLocalDpi xmlns:a14="http://schemas.microsoft.com/office/drawing/2010/main" val="0"/>
+              </a:ext>
+            </a:extLst>
+          </a:blip>
+          <a:srcRect l="30119" t="50085" r="35639" b="43662"/>
+          <a:stretch/>
+        </p:blipFill>
+        <p:spPr>
+          <a:xfrm>
+            <a:off x="921328" y="2387599"/>
+            <a:ext cx="5791200" cy="812801"/>
+          </a:xfrm>
+          <a:prstGeom prst="rect">
+            <a:avLst/>
+          </a:prstGeom>
+        </p:spPr>
+      </p:pic>
+      <p:pic>
+        <p:nvPicPr>
+          <p:cNvPr id="6" name="Picture 5"/>
+          <p:cNvPicPr>
+            <a:picLocks noChangeAspect="1"/>
+          </p:cNvPicPr>
+          <p:nvPr/>
+        </p:nvPicPr>
+        <p:blipFill rotWithShape="1">
+          <a:blip r:embed="rId2">
+            <a:extLst>
+              <a:ext uri="{28A0092B-C50C-407E-A947-70E740481C1C}">
+                <a14:useLocalDpi xmlns:a14="http://schemas.microsoft.com/office/drawing/2010/main" val="0"/>
+              </a:ext>
+            </a:extLst>
+          </a:blip>
+          <a:srcRect l="24242" t="61184" r="28333" b="29384"/>
+          <a:stretch/>
+        </p:blipFill>
+        <p:spPr>
+          <a:xfrm>
+            <a:off x="0" y="3657600"/>
+            <a:ext cx="7620000" cy="1295400"/>
+          </a:xfrm>
+          <a:prstGeom prst="rect">
+            <a:avLst/>
+          </a:prstGeom>
+        </p:spPr>
+      </p:pic>
+    </p:spTree>
+    <p:extLst>
+      <p:ext uri="{BB962C8B-B14F-4D97-AF65-F5344CB8AC3E}">
+        <p14:creationId xmlns:p14="http://schemas.microsoft.com/office/powerpoint/2010/main" val="84013435"/>
+      </p:ext>
+    </p:extLst>
+  </p:cSld>
+  <p:clrMapOvr>
+    <a:masterClrMapping/>
+  </p:clrMapOvr>
+</p:sld>
+</file>
+
+<file path=ppt/slides/slide6.xml><?xml version="1.0" encoding="utf-8"?>
+<p:sld xmlns:a="http://schemas.openxmlformats.org/drawingml/2006/main" xmlns:r="http://schemas.openxmlformats.org/officeDocument/2006/relationships" xmlns:p="http://schemas.openxmlformats.org/presentationml/2006/main">
+  <p:cSld>
+    <p:spTree>
+      <p:nvGrpSpPr>
+        <p:cNvPr id="1" name=""/>
+        <p:cNvGrpSpPr/>
+        <p:nvPr/>
+      </p:nvGrpSpPr>
+      <p:grpSpPr>
+        <a:xfrm>
+          <a:off x="0" y="0"/>
+          <a:ext cx="0" cy="0"/>
+          <a:chOff x="0" y="0"/>
+          <a:chExt cx="0" cy="0"/>
+        </a:xfrm>
+      </p:grpSpPr>
+      <p:sp>
+        <p:nvSpPr>
+          <p:cNvPr id="3" name="Content Placeholder 2"/>
+          <p:cNvSpPr>
+            <a:spLocks noGrp="1"/>
+          </p:cNvSpPr>
+          <p:nvPr>
+            <p:ph idx="1"/>
+          </p:nvPr>
+        </p:nvSpPr>
+        <p:spPr>
+          <a:xfrm>
+            <a:off x="381000" y="1371600"/>
+            <a:ext cx="7620000" cy="4495800"/>
+          </a:xfrm>
+        </p:spPr>
+        <p:txBody>
+          <a:bodyPr/>
+          <a:lstStyle/>
+          <a:p>
+            <a:r>
+              <a:rPr lang="en-US" dirty="0" smtClean="0"/>
+              <a:t>Where,</a:t>
+            </a:r>
+            <a:endParaRPr lang="en-US" dirty="0"/>
+          </a:p>
+        </p:txBody>
+      </p:sp>
+      <p:pic>
+        <p:nvPicPr>
+          <p:cNvPr id="4" name="Picture 3"/>
+          <p:cNvPicPr>
+            <a:picLocks noChangeAspect="1"/>
+          </p:cNvPicPr>
+          <p:nvPr/>
+        </p:nvPicPr>
+        <p:blipFill>
+          <a:blip r:embed="rId2">
+            <a:extLst>
+              <a:ext uri="{28A0092B-C50C-407E-A947-70E740481C1C}">
+                <a14:useLocalDpi xmlns:a14="http://schemas.microsoft.com/office/drawing/2010/main" val="0"/>
+              </a:ext>
+            </a:extLst>
+          </a:blip>
+          <a:stretch>
+            <a:fillRect/>
+          </a:stretch>
+        </p:blipFill>
+        <p:spPr>
+          <a:xfrm>
+            <a:off x="533400" y="1752600"/>
+            <a:ext cx="7620000" cy="3733800"/>
+          </a:xfrm>
+          <a:prstGeom prst="rect">
+            <a:avLst/>
+          </a:prstGeom>
+        </p:spPr>
+      </p:pic>
+      <p:sp>
+        <p:nvSpPr>
+          <p:cNvPr id="5" name="TextBox 4"/>
+          <p:cNvSpPr txBox="1"/>
+          <p:nvPr/>
+        </p:nvSpPr>
+        <p:spPr>
+          <a:xfrm>
+            <a:off x="228600" y="381000"/>
+            <a:ext cx="7924800" cy="584775"/>
+          </a:xfrm>
+          <a:prstGeom prst="rect">
+            <a:avLst/>
+          </a:prstGeom>
+          <a:noFill/>
+        </p:spPr>
+        <p:txBody>
+          <a:bodyPr wrap="square" rtlCol="0">
+            <a:spAutoFit/>
+          </a:bodyPr>
+          <a:lstStyle/>
+          <a:p>
+            <a:r>
+              <a:rPr lang="en-US" sz="3200" dirty="0">
+                <a:solidFill>
+                  <a:schemeClr val="tx2"/>
+                </a:solidFill>
+                <a:latin typeface="Times New Roman" pitchFamily="18" charset="0"/>
+                <a:cs typeface="Times New Roman" pitchFamily="18" charset="0"/>
+              </a:rPr>
+              <a:t>Important concepts and functions in PSO. </a:t>
+            </a:r>
+            <a:r>
+              <a:rPr lang="en-US" sz="3200" dirty="0" smtClean="0">
+                <a:solidFill>
+                  <a:schemeClr val="tx2"/>
+                </a:solidFill>
+                <a:latin typeface="Times New Roman" pitchFamily="18" charset="0"/>
+                <a:cs typeface="Times New Roman" pitchFamily="18" charset="0"/>
+              </a:rPr>
+              <a:t>(4/4)</a:t>
+            </a:r>
+            <a:endParaRPr lang="en-US" sz="3200" dirty="0">
+              <a:solidFill>
+                <a:schemeClr val="tx2"/>
+              </a:solidFill>
+            </a:endParaRPr>
+          </a:p>
+        </p:txBody>
+      </p:sp>
+    </p:spTree>
+    <p:extLst>
+      <p:ext uri="{BB962C8B-B14F-4D97-AF65-F5344CB8AC3E}">
+        <p14:creationId xmlns:p14="http://schemas.microsoft.com/office/powerpoint/2010/main" val="478613473"/>
+      </p:ext>
+    </p:extLst>
+  </p:cSld>
+  <p:clrMapOvr>
+    <a:masterClrMapping/>
+  </p:clrMapOvr>
+</p:sld>
+</file>
+
+<file path=ppt/slides/slide7.xml><?xml version="1.0" encoding="utf-8"?>
 <p:sld xmlns:a="http://schemas.openxmlformats.org/drawingml/2006/main" xmlns:r="http://schemas.openxmlformats.org/officeDocument/2006/relationships" xmlns:p="http://schemas.openxmlformats.org/presentationml/2006/main">
   <p:cSld>
     <p:spTree>
@@ -3833,7 +4778,7 @@
 </p:sld>
 </file>
 
-<file path=ppt/slides/slide4.xml><?xml version="1.0" encoding="utf-8"?>
+<file path=ppt/slides/slide8.xml><?xml version="1.0" encoding="utf-8"?>
 <p:sld xmlns:a="http://schemas.openxmlformats.org/drawingml/2006/main" xmlns:r="http://schemas.openxmlformats.org/officeDocument/2006/relationships" xmlns:p="http://schemas.openxmlformats.org/presentationml/2006/main">
   <p:cSld>
     <p:spTree>
@@ -3959,442 +4904,6 @@
 </p:sld>
 </file>
 
-<file path=ppt/slides/slide5.xml><?xml version="1.0" encoding="utf-8"?>
-<p:sld xmlns:a="http://schemas.openxmlformats.org/drawingml/2006/main" xmlns:r="http://schemas.openxmlformats.org/officeDocument/2006/relationships" xmlns:p="http://schemas.openxmlformats.org/presentationml/2006/main">
-  <p:cSld>
-    <p:spTree>
-      <p:nvGrpSpPr>
-        <p:cNvPr id="1" name=""/>
-        <p:cNvGrpSpPr/>
-        <p:nvPr/>
-      </p:nvGrpSpPr>
-      <p:grpSpPr>
-        <a:xfrm>
-          <a:off x="0" y="0"/>
-          <a:ext cx="0" cy="0"/>
-          <a:chOff x="0" y="0"/>
-          <a:chExt cx="0" cy="0"/>
-        </a:xfrm>
-      </p:grpSpPr>
-      <p:sp>
-        <p:nvSpPr>
-          <p:cNvPr id="2" name="Title 1"/>
-          <p:cNvSpPr>
-            <a:spLocks noGrp="1"/>
-          </p:cNvSpPr>
-          <p:nvPr>
-            <p:ph type="title"/>
-          </p:nvPr>
-        </p:nvSpPr>
-        <p:spPr/>
-        <p:txBody>
-          <a:bodyPr>
-            <a:normAutofit fontScale="90000"/>
-          </a:bodyPr>
-          <a:lstStyle/>
-          <a:p>
-            <a:r>
-              <a:rPr lang="en-US" sz="3600" dirty="0" smtClean="0">
-                <a:latin typeface="Times New Roman" pitchFamily="18" charset="0"/>
-                <a:cs typeface="Times New Roman" pitchFamily="18" charset="0"/>
-              </a:rPr>
-              <a:t>Important concepts and functions in PSO. (1/2)</a:t>
-            </a:r>
-            <a:endParaRPr lang="en-US" sz="3600" dirty="0">
-              <a:latin typeface="Times New Roman" pitchFamily="18" charset="0"/>
-              <a:cs typeface="Times New Roman" pitchFamily="18" charset="0"/>
-            </a:endParaRPr>
-          </a:p>
-        </p:txBody>
-      </p:sp>
-      <p:sp>
-        <p:nvSpPr>
-          <p:cNvPr id="3" name="Content Placeholder 2"/>
-          <p:cNvSpPr>
-            <a:spLocks noGrp="1"/>
-          </p:cNvSpPr>
-          <p:nvPr>
-            <p:ph idx="1"/>
-          </p:nvPr>
-        </p:nvSpPr>
-        <p:spPr/>
-        <p:txBody>
-          <a:bodyPr/>
-          <a:lstStyle/>
-          <a:p>
-            <a:pPr marL="114300" indent="0">
-              <a:buNone/>
-            </a:pPr>
-            <a:r>
-              <a:rPr lang="en-US" sz="2400" b="1" u="sng" dirty="0" smtClean="0"/>
-              <a:t>Concepts:</a:t>
-            </a:r>
-            <a:r>
-              <a:rPr lang="en-US" dirty="0" smtClean="0"/>
-              <a:t> </a:t>
-            </a:r>
-            <a:endParaRPr lang="en-US" dirty="0"/>
-          </a:p>
-          <a:p>
-            <a:r>
-              <a:rPr lang="en-US" dirty="0"/>
-              <a:t>As it is a population based method, it works iteratively until the terminal point is reached </a:t>
-            </a:r>
-          </a:p>
-          <a:p>
-            <a:r>
-              <a:rPr lang="en-US" dirty="0"/>
-              <a:t>Uses many particles (referred to as swarm) which are moving in search for best solution </a:t>
-            </a:r>
-          </a:p>
-          <a:p>
-            <a:r>
-              <a:rPr lang="en-US" dirty="0"/>
-              <a:t>Each particle has its fitness value which is evaluated by the fitness function </a:t>
-            </a:r>
-          </a:p>
-          <a:p>
-            <a:r>
-              <a:rPr lang="en-US" dirty="0"/>
-              <a:t>All the particle has certain velocities which directs the flying of the particles </a:t>
-            </a:r>
-          </a:p>
-          <a:p>
-            <a:r>
-              <a:rPr lang="en-US" dirty="0"/>
-              <a:t>Particles fly through the space by following the current optimum particles</a:t>
-            </a:r>
-          </a:p>
-        </p:txBody>
-      </p:sp>
-    </p:spTree>
-    <p:extLst>
-      <p:ext uri="{BB962C8B-B14F-4D97-AF65-F5344CB8AC3E}">
-        <p14:creationId xmlns:p14="http://schemas.microsoft.com/office/powerpoint/2010/main" val="3792755165"/>
-      </p:ext>
-    </p:extLst>
-  </p:cSld>
-  <p:clrMapOvr>
-    <a:masterClrMapping/>
-  </p:clrMapOvr>
-</p:sld>
-</file>
-
-<file path=ppt/slides/slide6.xml><?xml version="1.0" encoding="utf-8"?>
-<p:sld xmlns:a="http://schemas.openxmlformats.org/drawingml/2006/main" xmlns:r="http://schemas.openxmlformats.org/officeDocument/2006/relationships" xmlns:p="http://schemas.openxmlformats.org/presentationml/2006/main">
-  <p:cSld>
-    <p:spTree>
-      <p:nvGrpSpPr>
-        <p:cNvPr id="1" name=""/>
-        <p:cNvGrpSpPr/>
-        <p:nvPr/>
-      </p:nvGrpSpPr>
-      <p:grpSpPr>
-        <a:xfrm>
-          <a:off x="0" y="0"/>
-          <a:ext cx="0" cy="0"/>
-          <a:chOff x="0" y="0"/>
-          <a:chExt cx="0" cy="0"/>
-        </a:xfrm>
-      </p:grpSpPr>
-      <p:sp>
-        <p:nvSpPr>
-          <p:cNvPr id="2" name="Title 1"/>
-          <p:cNvSpPr>
-            <a:spLocks noGrp="1"/>
-          </p:cNvSpPr>
-          <p:nvPr>
-            <p:ph type="title"/>
-          </p:nvPr>
-        </p:nvSpPr>
-        <p:spPr/>
-        <p:txBody>
-          <a:bodyPr/>
-          <a:lstStyle/>
-          <a:p>
-            <a:r>
-              <a:rPr lang="en-US" sz="3200" dirty="0">
-                <a:latin typeface="Times New Roman" pitchFamily="18" charset="0"/>
-                <a:cs typeface="Times New Roman" pitchFamily="18" charset="0"/>
-              </a:rPr>
-              <a:t>Important concepts and functions in PSO. </a:t>
-            </a:r>
-            <a:r>
-              <a:rPr lang="en-US" sz="3200" dirty="0" smtClean="0">
-                <a:latin typeface="Times New Roman" pitchFamily="18" charset="0"/>
-                <a:cs typeface="Times New Roman" pitchFamily="18" charset="0"/>
-              </a:rPr>
-              <a:t>(2/2</a:t>
-            </a:r>
-            <a:r>
-              <a:rPr lang="en-US" sz="3200" dirty="0">
-                <a:latin typeface="Times New Roman" pitchFamily="18" charset="0"/>
-                <a:cs typeface="Times New Roman" pitchFamily="18" charset="0"/>
-              </a:rPr>
-              <a:t>)</a:t>
-            </a:r>
-            <a:endParaRPr lang="en-US" sz="3200" dirty="0"/>
-          </a:p>
-        </p:txBody>
-      </p:sp>
-      <p:sp>
-        <p:nvSpPr>
-          <p:cNvPr id="3" name="Content Placeholder 2"/>
-          <p:cNvSpPr>
-            <a:spLocks noGrp="1"/>
-          </p:cNvSpPr>
-          <p:nvPr>
-            <p:ph idx="1"/>
-          </p:nvPr>
-        </p:nvSpPr>
-        <p:spPr/>
-        <p:txBody>
-          <a:bodyPr/>
-          <a:lstStyle/>
-          <a:p>
-            <a:pPr marL="114300" indent="0">
-              <a:buNone/>
-            </a:pPr>
-            <a:r>
-              <a:rPr lang="en-US" sz="2800" b="1" u="sng" dirty="0" smtClean="0"/>
-              <a:t>Functions: </a:t>
-            </a:r>
-            <a:endParaRPr lang="en-US" sz="2400" b="1" u="sng" dirty="0" smtClean="0"/>
-          </a:p>
-          <a:p>
-            <a:r>
-              <a:rPr lang="en-US" dirty="0" smtClean="0"/>
-              <a:t>It starts with a group of random particles </a:t>
-            </a:r>
-          </a:p>
-          <a:p>
-            <a:r>
-              <a:rPr lang="en-US" dirty="0" smtClean="0"/>
-              <a:t>Searches for the optimal value by updating generations </a:t>
-            </a:r>
-          </a:p>
-          <a:p>
-            <a:r>
-              <a:rPr lang="en-US" dirty="0" smtClean="0"/>
-              <a:t>Particles move in the solution space and are evaluated according to a fitness criteria </a:t>
-            </a:r>
-          </a:p>
-          <a:p>
-            <a:r>
-              <a:rPr lang="en-US" dirty="0" smtClean="0"/>
-              <a:t>After every iteration, the "best" values of each particle is updated </a:t>
-            </a:r>
-            <a:r>
-              <a:rPr lang="en-US" dirty="0" err="1" smtClean="0"/>
-              <a:t>i.E.</a:t>
-            </a:r>
-            <a:r>
-              <a:rPr lang="en-US" dirty="0" smtClean="0"/>
-              <a:t> </a:t>
-            </a:r>
-            <a:r>
-              <a:rPr lang="en-US" dirty="0" err="1" smtClean="0"/>
-              <a:t>Pbest</a:t>
-            </a:r>
-            <a:r>
-              <a:rPr lang="en-US" dirty="0" smtClean="0"/>
-              <a:t> (personal best) and </a:t>
-            </a:r>
-            <a:r>
-              <a:rPr lang="en-US" dirty="0" err="1" smtClean="0"/>
-              <a:t>gbest</a:t>
-            </a:r>
-            <a:r>
-              <a:rPr lang="en-US" dirty="0" smtClean="0"/>
-              <a:t> (global best)</a:t>
-            </a:r>
-          </a:p>
-          <a:p>
-            <a:endParaRPr lang="en-US" b="1" u="sng" dirty="0" smtClean="0"/>
-          </a:p>
-          <a:p>
-            <a:pPr marL="114300" indent="0">
-              <a:buNone/>
-            </a:pPr>
-            <a:endParaRPr lang="en-US" b="1" u="sng" dirty="0"/>
-          </a:p>
-        </p:txBody>
-      </p:sp>
-    </p:spTree>
-    <p:extLst>
-      <p:ext uri="{BB962C8B-B14F-4D97-AF65-F5344CB8AC3E}">
-        <p14:creationId xmlns:p14="http://schemas.microsoft.com/office/powerpoint/2010/main" val="828917097"/>
-      </p:ext>
-    </p:extLst>
-  </p:cSld>
-  <p:clrMapOvr>
-    <a:masterClrMapping/>
-  </p:clrMapOvr>
-</p:sld>
-</file>
-
-<file path=ppt/slides/slide7.xml><?xml version="1.0" encoding="utf-8"?>
-<p:sld xmlns:a="http://schemas.openxmlformats.org/drawingml/2006/main" xmlns:r="http://schemas.openxmlformats.org/officeDocument/2006/relationships" xmlns:p="http://schemas.openxmlformats.org/presentationml/2006/main">
-  <p:cSld>
-    <p:spTree>
-      <p:nvGrpSpPr>
-        <p:cNvPr id="1" name=""/>
-        <p:cNvGrpSpPr/>
-        <p:nvPr/>
-      </p:nvGrpSpPr>
-      <p:grpSpPr>
-        <a:xfrm>
-          <a:off x="0" y="0"/>
-          <a:ext cx="0" cy="0"/>
-          <a:chOff x="0" y="0"/>
-          <a:chExt cx="0" cy="0"/>
-        </a:xfrm>
-      </p:grpSpPr>
-      <p:sp>
-        <p:nvSpPr>
-          <p:cNvPr id="2" name="Title 1"/>
-          <p:cNvSpPr>
-            <a:spLocks noGrp="1"/>
-          </p:cNvSpPr>
-          <p:nvPr>
-            <p:ph type="title"/>
-          </p:nvPr>
-        </p:nvSpPr>
-        <p:spPr/>
-        <p:txBody>
-          <a:bodyPr>
-            <a:normAutofit/>
-          </a:bodyPr>
-          <a:lstStyle/>
-          <a:p>
-            <a:pPr algn="l"/>
-            <a:r>
-              <a:rPr lang="en-US" sz="3600" dirty="0" smtClean="0">
-                <a:latin typeface="Times New Roman" pitchFamily="18" charset="0"/>
-                <a:cs typeface="Times New Roman" pitchFamily="18" charset="0"/>
-              </a:rPr>
-              <a:t>Theoretical Analysis (time complexity)</a:t>
-            </a:r>
-            <a:endParaRPr lang="en-US" sz="3600" dirty="0">
-              <a:latin typeface="Times New Roman" pitchFamily="18" charset="0"/>
-              <a:cs typeface="Times New Roman" pitchFamily="18" charset="0"/>
-            </a:endParaRPr>
-          </a:p>
-        </p:txBody>
-      </p:sp>
-      <p:sp>
-        <p:nvSpPr>
-          <p:cNvPr id="3" name="Content Placeholder 2"/>
-          <p:cNvSpPr>
-            <a:spLocks noGrp="1"/>
-          </p:cNvSpPr>
-          <p:nvPr>
-            <p:ph idx="1"/>
-          </p:nvPr>
-        </p:nvSpPr>
-        <p:spPr/>
-        <p:txBody>
-          <a:bodyPr/>
-          <a:lstStyle/>
-          <a:p>
-            <a:endParaRPr lang="en-US"/>
-          </a:p>
-        </p:txBody>
-      </p:sp>
-    </p:spTree>
-    <p:extLst>
-      <p:ext uri="{BB962C8B-B14F-4D97-AF65-F5344CB8AC3E}">
-        <p14:creationId xmlns:p14="http://schemas.microsoft.com/office/powerpoint/2010/main" val="767474351"/>
-      </p:ext>
-    </p:extLst>
-  </p:cSld>
-  <p:clrMapOvr>
-    <a:masterClrMapping/>
-  </p:clrMapOvr>
-</p:sld>
-</file>
-
-<file path=ppt/slides/slide8.xml><?xml version="1.0" encoding="utf-8"?>
-<p:sld xmlns:a="http://schemas.openxmlformats.org/drawingml/2006/main" xmlns:r="http://schemas.openxmlformats.org/officeDocument/2006/relationships" xmlns:p="http://schemas.openxmlformats.org/presentationml/2006/main">
-  <p:cSld>
-    <p:spTree>
-      <p:nvGrpSpPr>
-        <p:cNvPr id="1" name=""/>
-        <p:cNvGrpSpPr/>
-        <p:nvPr/>
-      </p:nvGrpSpPr>
-      <p:grpSpPr>
-        <a:xfrm>
-          <a:off x="0" y="0"/>
-          <a:ext cx="0" cy="0"/>
-          <a:chOff x="0" y="0"/>
-          <a:chExt cx="0" cy="0"/>
-        </a:xfrm>
-      </p:grpSpPr>
-      <p:sp>
-        <p:nvSpPr>
-          <p:cNvPr id="2" name="Title 1"/>
-          <p:cNvSpPr>
-            <a:spLocks noGrp="1"/>
-          </p:cNvSpPr>
-          <p:nvPr>
-            <p:ph type="title"/>
-          </p:nvPr>
-        </p:nvSpPr>
-        <p:spPr/>
-        <p:txBody>
-          <a:bodyPr>
-            <a:normAutofit/>
-          </a:bodyPr>
-          <a:lstStyle/>
-          <a:p>
-            <a:pPr algn="l"/>
-            <a:r>
-              <a:rPr lang="en-US" sz="3600" dirty="0" smtClean="0">
-                <a:latin typeface="Times New Roman" pitchFamily="18" charset="0"/>
-                <a:cs typeface="Times New Roman" pitchFamily="18" charset="0"/>
-              </a:rPr>
-              <a:t>Implementation of PSO</a:t>
-            </a:r>
-            <a:endParaRPr lang="en-US" sz="3600" dirty="0">
-              <a:latin typeface="Times New Roman" pitchFamily="18" charset="0"/>
-              <a:cs typeface="Times New Roman" pitchFamily="18" charset="0"/>
-            </a:endParaRPr>
-          </a:p>
-        </p:txBody>
-      </p:sp>
-      <p:sp>
-        <p:nvSpPr>
-          <p:cNvPr id="3" name="Content Placeholder 2"/>
-          <p:cNvSpPr>
-            <a:spLocks noGrp="1"/>
-          </p:cNvSpPr>
-          <p:nvPr>
-            <p:ph idx="1"/>
-          </p:nvPr>
-        </p:nvSpPr>
-        <p:spPr/>
-        <p:txBody>
-          <a:bodyPr/>
-          <a:lstStyle/>
-          <a:p>
-            <a:endParaRPr lang="en-US" dirty="0"/>
-          </a:p>
-        </p:txBody>
-      </p:sp>
-    </p:spTree>
-    <p:extLst>
-      <p:ext uri="{BB962C8B-B14F-4D97-AF65-F5344CB8AC3E}">
-        <p14:creationId xmlns:p14="http://schemas.microsoft.com/office/powerpoint/2010/main" val="3472087063"/>
-      </p:ext>
-    </p:extLst>
-  </p:cSld>
-  <p:clrMapOvr>
-    <a:masterClrMapping/>
-  </p:clrMapOvr>
-</p:sld>
-</file>
-
 <file path=ppt/slides/slide9.xml><?xml version="1.0" encoding="utf-8"?>
 <p:sld xmlns:a="http://schemas.openxmlformats.org/drawingml/2006/main" xmlns:r="http://schemas.openxmlformats.org/officeDocument/2006/relationships" xmlns:p="http://schemas.openxmlformats.org/presentationml/2006/main">
   <p:cSld>
@@ -4435,7 +4944,7 @@
                 <a:latin typeface="Times New Roman" pitchFamily="18" charset="0"/>
                 <a:cs typeface="Times New Roman" pitchFamily="18" charset="0"/>
               </a:rPr>
-              <a:t>Experimental Analysis </a:t>
+              <a:t>Theoretical Analysis (time complexity)</a:t>
             </a:r>
             <a:endParaRPr lang="en-US" sz="3600" dirty="0">
               <a:latin typeface="Times New Roman" pitchFamily="18" charset="0"/>
@@ -4466,7 +4975,7 @@
     </p:spTree>
     <p:extLst>
       <p:ext uri="{BB962C8B-B14F-4D97-AF65-F5344CB8AC3E}">
-        <p14:creationId xmlns:p14="http://schemas.microsoft.com/office/powerpoint/2010/main" val="3488954058"/>
+        <p14:creationId xmlns:p14="http://schemas.microsoft.com/office/powerpoint/2010/main" val="767474351"/>
       </p:ext>
     </p:extLst>
   </p:cSld>

</xml_diff>

<commit_message>
Time Complexity Of PSO
</commit_message>
<xml_diff>
--- a/Documentation/Presentation (interim demo).pptx
+++ b/Documentation/Presentation (interim demo).pptx
@@ -329,7 +329,7 @@
           <a:p>
             <a:fld id="{18DA7A65-120B-44B5-9CA7-EC23E690165B}" type="datetimeFigureOut">
               <a:rPr lang="en-US" smtClean="0"/>
-              <a:t>6/7/2020</a:t>
+              <a:t>6/8/2020</a:t>
             </a:fld>
             <a:endParaRPr lang="en-US"/>
           </a:p>
@@ -494,7 +494,7 @@
           <a:p>
             <a:fld id="{18DA7A65-120B-44B5-9CA7-EC23E690165B}" type="datetimeFigureOut">
               <a:rPr lang="en-US" smtClean="0"/>
-              <a:t>6/7/2020</a:t>
+              <a:t>6/8/2020</a:t>
             </a:fld>
             <a:endParaRPr lang="en-US"/>
           </a:p>
@@ -669,7 +669,7 @@
           <a:p>
             <a:fld id="{18DA7A65-120B-44B5-9CA7-EC23E690165B}" type="datetimeFigureOut">
               <a:rPr lang="en-US" smtClean="0"/>
-              <a:t>6/7/2020</a:t>
+              <a:t>6/8/2020</a:t>
             </a:fld>
             <a:endParaRPr lang="en-US"/>
           </a:p>
@@ -834,7 +834,7 @@
           <a:p>
             <a:fld id="{18DA7A65-120B-44B5-9CA7-EC23E690165B}" type="datetimeFigureOut">
               <a:rPr lang="en-US" smtClean="0"/>
-              <a:t>6/7/2020</a:t>
+              <a:t>6/8/2020</a:t>
             </a:fld>
             <a:endParaRPr lang="en-US"/>
           </a:p>
@@ -1075,7 +1075,7 @@
           <a:p>
             <a:fld id="{18DA7A65-120B-44B5-9CA7-EC23E690165B}" type="datetimeFigureOut">
               <a:rPr lang="en-US" smtClean="0"/>
-              <a:t>6/7/2020</a:t>
+              <a:t>6/8/2020</a:t>
             </a:fld>
             <a:endParaRPr lang="en-US"/>
           </a:p>
@@ -1358,7 +1358,7 @@
           <a:p>
             <a:fld id="{18DA7A65-120B-44B5-9CA7-EC23E690165B}" type="datetimeFigureOut">
               <a:rPr lang="en-US" smtClean="0"/>
-              <a:t>6/7/2020</a:t>
+              <a:t>6/8/2020</a:t>
             </a:fld>
             <a:endParaRPr lang="en-US"/>
           </a:p>
@@ -1787,7 +1787,7 @@
           <a:p>
             <a:fld id="{18DA7A65-120B-44B5-9CA7-EC23E690165B}" type="datetimeFigureOut">
               <a:rPr lang="en-US" smtClean="0"/>
-              <a:t>6/7/2020</a:t>
+              <a:t>6/8/2020</a:t>
             </a:fld>
             <a:endParaRPr lang="en-US"/>
           </a:p>
@@ -1900,7 +1900,7 @@
           <a:p>
             <a:fld id="{18DA7A65-120B-44B5-9CA7-EC23E690165B}" type="datetimeFigureOut">
               <a:rPr lang="en-US" smtClean="0"/>
-              <a:t>6/7/2020</a:t>
+              <a:t>6/8/2020</a:t>
             </a:fld>
             <a:endParaRPr lang="en-US"/>
           </a:p>
@@ -1990,7 +1990,7 @@
           <a:p>
             <a:fld id="{18DA7A65-120B-44B5-9CA7-EC23E690165B}" type="datetimeFigureOut">
               <a:rPr lang="en-US" smtClean="0"/>
-              <a:t>6/7/2020</a:t>
+              <a:t>6/8/2020</a:t>
             </a:fld>
             <a:endParaRPr lang="en-US"/>
           </a:p>
@@ -2179,7 +2179,7 @@
           <a:p>
             <a:fld id="{18DA7A65-120B-44B5-9CA7-EC23E690165B}" type="datetimeFigureOut">
               <a:rPr lang="en-US" smtClean="0"/>
-              <a:t>6/7/2020</a:t>
+              <a:t>6/8/2020</a:t>
             </a:fld>
             <a:endParaRPr lang="en-US"/>
           </a:p>
@@ -2497,7 +2497,7 @@
           <a:p>
             <a:fld id="{18DA7A65-120B-44B5-9CA7-EC23E690165B}" type="datetimeFigureOut">
               <a:rPr lang="en-US" smtClean="0"/>
-              <a:t>6/7/2020</a:t>
+              <a:t>6/8/2020</a:t>
             </a:fld>
             <a:endParaRPr lang="en-US"/>
           </a:p>
@@ -2876,7 +2876,7 @@
           <a:p>
             <a:fld id="{18DA7A65-120B-44B5-9CA7-EC23E690165B}" type="datetimeFigureOut">
               <a:rPr lang="en-US" smtClean="0"/>
-              <a:t>6/7/2020</a:t>
+              <a:t>6/8/2020</a:t>
             </a:fld>
             <a:endParaRPr lang="en-US"/>
           </a:p>
@@ -3457,22 +3457,534 @@
           </a:p>
         </p:txBody>
       </p:sp>
-      <p:sp>
-        <p:nvSpPr>
-          <p:cNvPr id="3" name="Content Placeholder 2"/>
-          <p:cNvSpPr>
-            <a:spLocks noGrp="1"/>
-          </p:cNvSpPr>
-          <p:nvPr>
-            <p:ph idx="1"/>
-          </p:nvPr>
-        </p:nvSpPr>
-        <p:spPr/>
-        <p:txBody>
-          <a:bodyPr/>
-          <a:lstStyle/>
-          <a:p>
-            <a:endParaRPr lang="en-US"/>
+      <p:pic>
+        <p:nvPicPr>
+          <p:cNvPr id="4" name="Content Placeholder 3"/>
+          <p:cNvPicPr>
+            <a:picLocks noChangeAspect="1"/>
+          </p:cNvPicPr>
+          <p:nvPr/>
+        </p:nvPicPr>
+        <p:blipFill>
+          <a:blip r:embed="rId2">
+            <a:extLst>
+              <a:ext uri="{28A0092B-C50C-407E-A947-70E740481C1C}">
+                <a14:useLocalDpi xmlns:a14="http://schemas.microsoft.com/office/drawing/2010/main" val="0"/>
+              </a:ext>
+            </a:extLst>
+          </a:blip>
+          <a:stretch>
+            <a:fillRect/>
+          </a:stretch>
+        </p:blipFill>
+        <p:spPr>
+          <a:xfrm>
+            <a:off x="457200" y="1417638"/>
+            <a:ext cx="5943600" cy="5309169"/>
+          </a:xfrm>
+          <a:prstGeom prst="rect">
+            <a:avLst/>
+          </a:prstGeom>
+        </p:spPr>
+      </p:pic>
+      <p:sp>
+        <p:nvSpPr>
+          <p:cNvPr id="5" name="TextBox 4"/>
+          <p:cNvSpPr txBox="1"/>
+          <p:nvPr/>
+        </p:nvSpPr>
+        <p:spPr>
+          <a:xfrm>
+            <a:off x="6629400" y="2209800"/>
+            <a:ext cx="1447800" cy="1200329"/>
+          </a:xfrm>
+          <a:prstGeom prst="rect">
+            <a:avLst/>
+          </a:prstGeom>
+          <a:noFill/>
+        </p:spPr>
+        <p:txBody>
+          <a:bodyPr wrap="square" rtlCol="0">
+            <a:spAutoFit/>
+          </a:bodyPr>
+          <a:lstStyle/>
+          <a:p>
+            <a:r>
+              <a:rPr lang="en-US" dirty="0" smtClean="0"/>
+              <a:t>O(n)</a:t>
+            </a:r>
+          </a:p>
+          <a:p>
+            <a:r>
+              <a:rPr lang="en-US" dirty="0" smtClean="0"/>
+              <a:t>O(1)</a:t>
+            </a:r>
+          </a:p>
+          <a:p>
+            <a:r>
+              <a:rPr lang="en-US" dirty="0" smtClean="0"/>
+              <a:t>O(1)</a:t>
+            </a:r>
+          </a:p>
+          <a:p>
+            <a:r>
+              <a:rPr lang="en-US" dirty="0" smtClean="0"/>
+              <a:t>O(1)</a:t>
+            </a:r>
+            <a:endParaRPr lang="en-US" dirty="0"/>
+          </a:p>
+        </p:txBody>
+      </p:sp>
+      <p:cxnSp>
+        <p:nvCxnSpPr>
+          <p:cNvPr id="7" name="Straight Arrow Connector 6"/>
+          <p:cNvCxnSpPr/>
+          <p:nvPr/>
+        </p:nvCxnSpPr>
+        <p:spPr>
+          <a:xfrm>
+            <a:off x="4648200" y="2438400"/>
+            <a:ext cx="1981200" cy="0"/>
+          </a:xfrm>
+          <a:prstGeom prst="straightConnector1">
+            <a:avLst/>
+          </a:prstGeom>
+          <a:ln>
+            <a:tailEnd type="triangle"/>
+          </a:ln>
+        </p:spPr>
+        <p:style>
+          <a:lnRef idx="1">
+            <a:schemeClr val="accent1"/>
+          </a:lnRef>
+          <a:fillRef idx="0">
+            <a:schemeClr val="accent1"/>
+          </a:fillRef>
+          <a:effectRef idx="0">
+            <a:schemeClr val="accent1"/>
+          </a:effectRef>
+          <a:fontRef idx="minor">
+            <a:schemeClr val="tx1"/>
+          </a:fontRef>
+        </p:style>
+      </p:cxnSp>
+      <p:cxnSp>
+        <p:nvCxnSpPr>
+          <p:cNvPr id="9" name="Straight Arrow Connector 8"/>
+          <p:cNvCxnSpPr/>
+          <p:nvPr/>
+        </p:nvCxnSpPr>
+        <p:spPr>
+          <a:xfrm>
+            <a:off x="4572000" y="2667000"/>
+            <a:ext cx="2057400" cy="0"/>
+          </a:xfrm>
+          <a:prstGeom prst="straightConnector1">
+            <a:avLst/>
+          </a:prstGeom>
+          <a:ln>
+            <a:tailEnd type="triangle"/>
+          </a:ln>
+        </p:spPr>
+        <p:style>
+          <a:lnRef idx="1">
+            <a:schemeClr val="accent1"/>
+          </a:lnRef>
+          <a:fillRef idx="0">
+            <a:schemeClr val="accent1"/>
+          </a:fillRef>
+          <a:effectRef idx="0">
+            <a:schemeClr val="accent1"/>
+          </a:effectRef>
+          <a:fontRef idx="minor">
+            <a:schemeClr val="tx1"/>
+          </a:fontRef>
+        </p:style>
+      </p:cxnSp>
+      <p:cxnSp>
+        <p:nvCxnSpPr>
+          <p:cNvPr id="12" name="Straight Arrow Connector 11"/>
+          <p:cNvCxnSpPr/>
+          <p:nvPr/>
+        </p:nvCxnSpPr>
+        <p:spPr>
+          <a:xfrm>
+            <a:off x="4953000" y="2895600"/>
+            <a:ext cx="1676400" cy="0"/>
+          </a:xfrm>
+          <a:prstGeom prst="straightConnector1">
+            <a:avLst/>
+          </a:prstGeom>
+          <a:ln>
+            <a:tailEnd type="triangle"/>
+          </a:ln>
+        </p:spPr>
+        <p:style>
+          <a:lnRef idx="1">
+            <a:schemeClr val="accent1"/>
+          </a:lnRef>
+          <a:fillRef idx="0">
+            <a:schemeClr val="accent1"/>
+          </a:fillRef>
+          <a:effectRef idx="0">
+            <a:schemeClr val="accent1"/>
+          </a:effectRef>
+          <a:fontRef idx="minor">
+            <a:schemeClr val="tx1"/>
+          </a:fontRef>
+        </p:style>
+      </p:cxnSp>
+      <p:cxnSp>
+        <p:nvCxnSpPr>
+          <p:cNvPr id="17" name="Straight Arrow Connector 16"/>
+          <p:cNvCxnSpPr/>
+          <p:nvPr/>
+        </p:nvCxnSpPr>
+        <p:spPr>
+          <a:xfrm>
+            <a:off x="3962400" y="3200400"/>
+            <a:ext cx="2667000" cy="0"/>
+          </a:xfrm>
+          <a:prstGeom prst="straightConnector1">
+            <a:avLst/>
+          </a:prstGeom>
+          <a:ln>
+            <a:tailEnd type="triangle"/>
+          </a:ln>
+        </p:spPr>
+        <p:style>
+          <a:lnRef idx="1">
+            <a:schemeClr val="accent1"/>
+          </a:lnRef>
+          <a:fillRef idx="0">
+            <a:schemeClr val="accent1"/>
+          </a:fillRef>
+          <a:effectRef idx="0">
+            <a:schemeClr val="accent1"/>
+          </a:effectRef>
+          <a:fontRef idx="minor">
+            <a:schemeClr val="tx1"/>
+          </a:fontRef>
+        </p:style>
+      </p:cxnSp>
+      <p:sp>
+        <p:nvSpPr>
+          <p:cNvPr id="19" name="TextBox 18"/>
+          <p:cNvSpPr txBox="1"/>
+          <p:nvPr/>
+        </p:nvSpPr>
+        <p:spPr>
+          <a:xfrm>
+            <a:off x="6629400" y="3992562"/>
+            <a:ext cx="631209" cy="1200329"/>
+          </a:xfrm>
+          <a:prstGeom prst="rect">
+            <a:avLst/>
+          </a:prstGeom>
+          <a:noFill/>
+        </p:spPr>
+        <p:txBody>
+          <a:bodyPr wrap="square" rtlCol="0">
+            <a:spAutoFit/>
+          </a:bodyPr>
+          <a:lstStyle/>
+          <a:p>
+            <a:r>
+              <a:rPr lang="en-US" dirty="0" smtClean="0"/>
+              <a:t>O(1)</a:t>
+            </a:r>
+          </a:p>
+          <a:p>
+            <a:endParaRPr lang="en-US" dirty="0"/>
+          </a:p>
+          <a:p>
+            <a:endParaRPr lang="en-US" dirty="0" smtClean="0"/>
+          </a:p>
+          <a:p>
+            <a:endParaRPr lang="en-US" dirty="0"/>
+          </a:p>
+        </p:txBody>
+      </p:sp>
+      <p:cxnSp>
+        <p:nvCxnSpPr>
+          <p:cNvPr id="21" name="Straight Arrow Connector 20"/>
+          <p:cNvCxnSpPr/>
+          <p:nvPr/>
+        </p:nvCxnSpPr>
+        <p:spPr>
+          <a:xfrm>
+            <a:off x="6172200" y="4191000"/>
+            <a:ext cx="457200" cy="0"/>
+          </a:xfrm>
+          <a:prstGeom prst="straightConnector1">
+            <a:avLst/>
+          </a:prstGeom>
+          <a:ln>
+            <a:tailEnd type="triangle"/>
+          </a:ln>
+        </p:spPr>
+        <p:style>
+          <a:lnRef idx="1">
+            <a:schemeClr val="accent1"/>
+          </a:lnRef>
+          <a:fillRef idx="0">
+            <a:schemeClr val="accent1"/>
+          </a:fillRef>
+          <a:effectRef idx="0">
+            <a:schemeClr val="accent1"/>
+          </a:effectRef>
+          <a:fontRef idx="minor">
+            <a:schemeClr val="tx1"/>
+          </a:fontRef>
+        </p:style>
+      </p:cxnSp>
+      <p:sp>
+        <p:nvSpPr>
+          <p:cNvPr id="22" name="TextBox 21"/>
+          <p:cNvSpPr txBox="1"/>
+          <p:nvPr/>
+        </p:nvSpPr>
+        <p:spPr>
+          <a:xfrm>
+            <a:off x="6629400" y="4816673"/>
+            <a:ext cx="1295400" cy="923330"/>
+          </a:xfrm>
+          <a:prstGeom prst="rect">
+            <a:avLst/>
+          </a:prstGeom>
+          <a:noFill/>
+        </p:spPr>
+        <p:txBody>
+          <a:bodyPr wrap="square" rtlCol="0">
+            <a:spAutoFit/>
+          </a:bodyPr>
+          <a:lstStyle/>
+          <a:p>
+            <a:r>
+              <a:rPr lang="en-US" dirty="0" smtClean="0"/>
+              <a:t>O(n)</a:t>
+            </a:r>
+          </a:p>
+          <a:p>
+            <a:r>
+              <a:rPr lang="en-US" dirty="0" smtClean="0"/>
+              <a:t>O(1)</a:t>
+            </a:r>
+          </a:p>
+          <a:p>
+            <a:r>
+              <a:rPr lang="en-US" dirty="0" smtClean="0"/>
+              <a:t>O(1)</a:t>
+            </a:r>
+          </a:p>
+        </p:txBody>
+      </p:sp>
+      <p:sp>
+        <p:nvSpPr>
+          <p:cNvPr id="23" name="TextBox 22"/>
+          <p:cNvSpPr txBox="1"/>
+          <p:nvPr/>
+        </p:nvSpPr>
+        <p:spPr>
+          <a:xfrm>
+            <a:off x="6629400" y="6079794"/>
+            <a:ext cx="876300" cy="381000"/>
+          </a:xfrm>
+          <a:prstGeom prst="rect">
+            <a:avLst/>
+          </a:prstGeom>
+          <a:noFill/>
+        </p:spPr>
+        <p:txBody>
+          <a:bodyPr wrap="square" rtlCol="0">
+            <a:spAutoFit/>
+          </a:bodyPr>
+          <a:lstStyle/>
+          <a:p>
+            <a:r>
+              <a:rPr lang="en-US" dirty="0" smtClean="0"/>
+              <a:t>O(n)</a:t>
+            </a:r>
+            <a:endParaRPr lang="en-US" dirty="0"/>
+          </a:p>
+        </p:txBody>
+      </p:sp>
+      <p:cxnSp>
+        <p:nvCxnSpPr>
+          <p:cNvPr id="25" name="Straight Arrow Connector 24"/>
+          <p:cNvCxnSpPr/>
+          <p:nvPr/>
+        </p:nvCxnSpPr>
+        <p:spPr>
+          <a:xfrm>
+            <a:off x="3276600" y="5029200"/>
+            <a:ext cx="3352800" cy="0"/>
+          </a:xfrm>
+          <a:prstGeom prst="straightConnector1">
+            <a:avLst/>
+          </a:prstGeom>
+          <a:ln>
+            <a:tailEnd type="triangle"/>
+          </a:ln>
+        </p:spPr>
+        <p:style>
+          <a:lnRef idx="1">
+            <a:schemeClr val="accent1"/>
+          </a:lnRef>
+          <a:fillRef idx="0">
+            <a:schemeClr val="accent1"/>
+          </a:fillRef>
+          <a:effectRef idx="0">
+            <a:schemeClr val="accent1"/>
+          </a:effectRef>
+          <a:fontRef idx="minor">
+            <a:schemeClr val="tx1"/>
+          </a:fontRef>
+        </p:style>
+      </p:cxnSp>
+      <p:cxnSp>
+        <p:nvCxnSpPr>
+          <p:cNvPr id="27" name="Straight Arrow Connector 26"/>
+          <p:cNvCxnSpPr>
+            <a:endCxn id="22" idx="1"/>
+          </p:cNvCxnSpPr>
+          <p:nvPr/>
+        </p:nvCxnSpPr>
+        <p:spPr>
+          <a:xfrm>
+            <a:off x="5791200" y="5278338"/>
+            <a:ext cx="838200" cy="0"/>
+          </a:xfrm>
+          <a:prstGeom prst="straightConnector1">
+            <a:avLst/>
+          </a:prstGeom>
+          <a:ln>
+            <a:tailEnd type="triangle"/>
+          </a:ln>
+        </p:spPr>
+        <p:style>
+          <a:lnRef idx="1">
+            <a:schemeClr val="accent1"/>
+          </a:lnRef>
+          <a:fillRef idx="0">
+            <a:schemeClr val="accent1"/>
+          </a:fillRef>
+          <a:effectRef idx="0">
+            <a:schemeClr val="accent1"/>
+          </a:effectRef>
+          <a:fontRef idx="minor">
+            <a:schemeClr val="tx1"/>
+          </a:fontRef>
+        </p:style>
+      </p:cxnSp>
+      <p:cxnSp>
+        <p:nvCxnSpPr>
+          <p:cNvPr id="29" name="Straight Arrow Connector 28"/>
+          <p:cNvCxnSpPr/>
+          <p:nvPr/>
+        </p:nvCxnSpPr>
+        <p:spPr>
+          <a:xfrm>
+            <a:off x="4648200" y="5562600"/>
+            <a:ext cx="1981200" cy="0"/>
+          </a:xfrm>
+          <a:prstGeom prst="straightConnector1">
+            <a:avLst/>
+          </a:prstGeom>
+          <a:ln>
+            <a:tailEnd type="triangle"/>
+          </a:ln>
+        </p:spPr>
+        <p:style>
+          <a:lnRef idx="1">
+            <a:schemeClr val="accent1"/>
+          </a:lnRef>
+          <a:fillRef idx="0">
+            <a:schemeClr val="accent1"/>
+          </a:fillRef>
+          <a:effectRef idx="0">
+            <a:schemeClr val="accent1"/>
+          </a:effectRef>
+          <a:fontRef idx="minor">
+            <a:schemeClr val="tx1"/>
+          </a:fontRef>
+        </p:style>
+      </p:cxnSp>
+      <p:cxnSp>
+        <p:nvCxnSpPr>
+          <p:cNvPr id="32" name="Straight Arrow Connector 31"/>
+          <p:cNvCxnSpPr>
+            <a:endCxn id="23" idx="1"/>
+          </p:cNvCxnSpPr>
+          <p:nvPr/>
+        </p:nvCxnSpPr>
+        <p:spPr>
+          <a:xfrm flipV="1">
+            <a:off x="5638800" y="6270294"/>
+            <a:ext cx="990600" cy="3108"/>
+          </a:xfrm>
+          <a:prstGeom prst="straightConnector1">
+            <a:avLst/>
+          </a:prstGeom>
+          <a:ln>
+            <a:tailEnd type="triangle"/>
+          </a:ln>
+        </p:spPr>
+        <p:style>
+          <a:lnRef idx="1">
+            <a:schemeClr val="accent1"/>
+          </a:lnRef>
+          <a:fillRef idx="0">
+            <a:schemeClr val="accent1"/>
+          </a:fillRef>
+          <a:effectRef idx="0">
+            <a:schemeClr val="accent1"/>
+          </a:effectRef>
+          <a:fontRef idx="minor">
+            <a:schemeClr val="tx1"/>
+          </a:fontRef>
+        </p:style>
+      </p:cxnSp>
+      <p:sp>
+        <p:nvSpPr>
+          <p:cNvPr id="33" name="TextBox 32"/>
+          <p:cNvSpPr txBox="1"/>
+          <p:nvPr/>
+        </p:nvSpPr>
+        <p:spPr>
+          <a:xfrm>
+            <a:off x="6400800" y="1415404"/>
+            <a:ext cx="2743200" cy="461665"/>
+          </a:xfrm>
+          <a:prstGeom prst="rect">
+            <a:avLst/>
+          </a:prstGeom>
+          <a:solidFill>
+            <a:schemeClr val="accent2">
+              <a:lumMod val="60000"/>
+              <a:lumOff val="40000"/>
+            </a:schemeClr>
+          </a:solidFill>
+        </p:spPr>
+        <p:txBody>
+          <a:bodyPr wrap="square" rtlCol="0">
+            <a:spAutoFit/>
+          </a:bodyPr>
+          <a:lstStyle/>
+          <a:p>
+            <a:r>
+              <a:rPr lang="en-US" sz="2400" dirty="0" smtClean="0"/>
+              <a:t>Worst Case : O(n</a:t>
+            </a:r>
+            <a:r>
+              <a:rPr lang="en-US" sz="2400" baseline="30000" dirty="0" smtClean="0"/>
+              <a:t>2</a:t>
+            </a:r>
+            <a:r>
+              <a:rPr lang="en-US" sz="2400" dirty="0" smtClean="0"/>
+              <a:t>)</a:t>
+            </a:r>
+            <a:endParaRPr lang="en-US" sz="2400" dirty="0"/>
           </a:p>
         </p:txBody>
       </p:sp>

</xml_diff>

<commit_message>
Few updations in slides
</commit_message>
<xml_diff>
--- a/Documentation/Presentation (interim demo).pptx
+++ b/Documentation/Presentation (interim demo).pptx
@@ -329,7 +329,7 @@
           <a:p>
             <a:fld id="{18DA7A65-120B-44B5-9CA7-EC23E690165B}" type="datetimeFigureOut">
               <a:rPr lang="en-US" smtClean="0"/>
-              <a:t>6/7/2020</a:t>
+              <a:t>6/8/2020</a:t>
             </a:fld>
             <a:endParaRPr lang="en-US"/>
           </a:p>
@@ -494,7 +494,7 @@
           <a:p>
             <a:fld id="{18DA7A65-120B-44B5-9CA7-EC23E690165B}" type="datetimeFigureOut">
               <a:rPr lang="en-US" smtClean="0"/>
-              <a:t>6/7/2020</a:t>
+              <a:t>6/8/2020</a:t>
             </a:fld>
             <a:endParaRPr lang="en-US"/>
           </a:p>
@@ -669,7 +669,7 @@
           <a:p>
             <a:fld id="{18DA7A65-120B-44B5-9CA7-EC23E690165B}" type="datetimeFigureOut">
               <a:rPr lang="en-US" smtClean="0"/>
-              <a:t>6/7/2020</a:t>
+              <a:t>6/8/2020</a:t>
             </a:fld>
             <a:endParaRPr lang="en-US"/>
           </a:p>
@@ -834,7 +834,7 @@
           <a:p>
             <a:fld id="{18DA7A65-120B-44B5-9CA7-EC23E690165B}" type="datetimeFigureOut">
               <a:rPr lang="en-US" smtClean="0"/>
-              <a:t>6/7/2020</a:t>
+              <a:t>6/8/2020</a:t>
             </a:fld>
             <a:endParaRPr lang="en-US"/>
           </a:p>
@@ -1075,7 +1075,7 @@
           <a:p>
             <a:fld id="{18DA7A65-120B-44B5-9CA7-EC23E690165B}" type="datetimeFigureOut">
               <a:rPr lang="en-US" smtClean="0"/>
-              <a:t>6/7/2020</a:t>
+              <a:t>6/8/2020</a:t>
             </a:fld>
             <a:endParaRPr lang="en-US"/>
           </a:p>
@@ -1358,7 +1358,7 @@
           <a:p>
             <a:fld id="{18DA7A65-120B-44B5-9CA7-EC23E690165B}" type="datetimeFigureOut">
               <a:rPr lang="en-US" smtClean="0"/>
-              <a:t>6/7/2020</a:t>
+              <a:t>6/8/2020</a:t>
             </a:fld>
             <a:endParaRPr lang="en-US"/>
           </a:p>
@@ -1787,7 +1787,7 @@
           <a:p>
             <a:fld id="{18DA7A65-120B-44B5-9CA7-EC23E690165B}" type="datetimeFigureOut">
               <a:rPr lang="en-US" smtClean="0"/>
-              <a:t>6/7/2020</a:t>
+              <a:t>6/8/2020</a:t>
             </a:fld>
             <a:endParaRPr lang="en-US"/>
           </a:p>
@@ -1900,7 +1900,7 @@
           <a:p>
             <a:fld id="{18DA7A65-120B-44B5-9CA7-EC23E690165B}" type="datetimeFigureOut">
               <a:rPr lang="en-US" smtClean="0"/>
-              <a:t>6/7/2020</a:t>
+              <a:t>6/8/2020</a:t>
             </a:fld>
             <a:endParaRPr lang="en-US"/>
           </a:p>
@@ -1990,7 +1990,7 @@
           <a:p>
             <a:fld id="{18DA7A65-120B-44B5-9CA7-EC23E690165B}" type="datetimeFigureOut">
               <a:rPr lang="en-US" smtClean="0"/>
-              <a:t>6/7/2020</a:t>
+              <a:t>6/8/2020</a:t>
             </a:fld>
             <a:endParaRPr lang="en-US"/>
           </a:p>
@@ -2179,7 +2179,7 @@
           <a:p>
             <a:fld id="{18DA7A65-120B-44B5-9CA7-EC23E690165B}" type="datetimeFigureOut">
               <a:rPr lang="en-US" smtClean="0"/>
-              <a:t>6/7/2020</a:t>
+              <a:t>6/8/2020</a:t>
             </a:fld>
             <a:endParaRPr lang="en-US"/>
           </a:p>
@@ -2497,7 +2497,7 @@
           <a:p>
             <a:fld id="{18DA7A65-120B-44B5-9CA7-EC23E690165B}" type="datetimeFigureOut">
               <a:rPr lang="en-US" smtClean="0"/>
-              <a:t>6/7/2020</a:t>
+              <a:t>6/8/2020</a:t>
             </a:fld>
             <a:endParaRPr lang="en-US"/>
           </a:p>
@@ -2876,7 +2876,7 @@
           <a:p>
             <a:fld id="{18DA7A65-120B-44B5-9CA7-EC23E690165B}" type="datetimeFigureOut">
               <a:rPr lang="en-US" smtClean="0"/>
-              <a:t>6/7/2020</a:t>
+              <a:t>6/8/2020</a:t>
             </a:fld>
             <a:endParaRPr lang="en-US"/>
           </a:p>
@@ -3486,6 +3486,13 @@
   <p:clrMapOvr>
     <a:masterClrMapping/>
   </p:clrMapOvr>
+  <p:timing>
+    <p:tnLst>
+      <p:par>
+        <p:cTn id="1" dur="indefinite" restart="never" nodeType="tmRoot"/>
+      </p:par>
+    </p:tnLst>
+  </p:timing>
 </p:sld>
 </file>
 
@@ -3852,18 +3859,18 @@
               <a:t>A population based stochastic algorithm based on </a:t>
             </a:r>
             <a:r>
-              <a:rPr lang="en-US" sz="2400" dirty="0" err="1">
-                <a:latin typeface="Times New Roman" pitchFamily="18" charset="0"/>
-                <a:cs typeface="Times New Roman" pitchFamily="18" charset="0"/>
-              </a:rPr>
-              <a:t>metaheuristic</a:t>
+              <a:rPr lang="en-US" sz="2400" dirty="0" smtClean="0">
+                <a:latin typeface="Times New Roman" pitchFamily="18" charset="0"/>
+                <a:cs typeface="Times New Roman" pitchFamily="18" charset="0"/>
+              </a:rPr>
+              <a:t>meta-heuristic </a:t>
             </a:r>
             <a:r>
               <a:rPr lang="en-US" sz="2400" dirty="0">
                 <a:latin typeface="Times New Roman" pitchFamily="18" charset="0"/>
                 <a:cs typeface="Times New Roman" pitchFamily="18" charset="0"/>
               </a:rPr>
-              <a:t> approach</a:t>
+              <a:t>approach</a:t>
             </a:r>
             <a:r>
               <a:rPr lang="en-US" sz="2400" dirty="0" smtClean="0">
@@ -3875,10 +3882,30 @@
           </a:p>
           <a:p>
             <a:r>
+              <a:rPr lang="en-US" sz="2400" dirty="0">
+                <a:latin typeface="Times New Roman" pitchFamily="18" charset="0"/>
+                <a:cs typeface="Times New Roman" pitchFamily="18" charset="0"/>
+              </a:rPr>
+              <a:t>Basic algorithm as proposed by Kennedy and Eberhart (1995</a:t>
+            </a:r>
+            <a:r>
               <a:rPr lang="en-US" sz="2400" dirty="0" smtClean="0">
                 <a:latin typeface="Times New Roman" pitchFamily="18" charset="0"/>
                 <a:cs typeface="Times New Roman" pitchFamily="18" charset="0"/>
               </a:rPr>
+              <a:t>)</a:t>
+            </a:r>
+            <a:endParaRPr lang="en-US" sz="2400" dirty="0" smtClean="0">
+              <a:latin typeface="Times New Roman" pitchFamily="18" charset="0"/>
+              <a:cs typeface="Times New Roman" pitchFamily="18" charset="0"/>
+            </a:endParaRPr>
+          </a:p>
+          <a:p>
+            <a:r>
+              <a:rPr lang="en-US" sz="2400" dirty="0" smtClean="0">
+                <a:latin typeface="Times New Roman" pitchFamily="18" charset="0"/>
+                <a:cs typeface="Times New Roman" pitchFamily="18" charset="0"/>
+              </a:rPr>
               <a:t>Used </a:t>
             </a:r>
             <a:r>
@@ -4003,8 +4030,19 @@
                 <a:latin typeface="Times New Roman" pitchFamily="18" charset="0"/>
                 <a:cs typeface="Times New Roman" pitchFamily="18" charset="0"/>
               </a:rPr>
-              <a:t>: predicting score of a football team using a math equation.</a:t>
-            </a:r>
+              <a:t>: predicting score of a football team using a math </a:t>
+            </a:r>
+            <a:r>
+              <a:rPr lang="en-US" sz="2400" dirty="0" smtClean="0">
+                <a:latin typeface="Times New Roman" pitchFamily="18" charset="0"/>
+                <a:cs typeface="Times New Roman" pitchFamily="18" charset="0"/>
+              </a:rPr>
+              <a:t>equation, neural networking etc.</a:t>
+            </a:r>
+            <a:endParaRPr lang="en-US" sz="2400" dirty="0">
+              <a:latin typeface="Times New Roman" pitchFamily="18" charset="0"/>
+              <a:cs typeface="Times New Roman" pitchFamily="18" charset="0"/>
+            </a:endParaRPr>
           </a:p>
         </p:txBody>
       </p:sp>
@@ -4249,8 +4287,19 @@
                 <a:latin typeface="Times New Roman" pitchFamily="18" charset="0"/>
                 <a:cs typeface="Times New Roman" pitchFamily="18" charset="0"/>
               </a:rPr>
-              <a:t>Each particle has its fitness value which is evaluated by the fitness function </a:t>
-            </a:r>
+              <a:t>Each particle has its fitness value which is evaluated by the fitness </a:t>
+            </a:r>
+            <a:r>
+              <a:rPr lang="en-US" sz="2400" dirty="0" smtClean="0">
+                <a:latin typeface="Times New Roman" pitchFamily="18" charset="0"/>
+                <a:cs typeface="Times New Roman" pitchFamily="18" charset="0"/>
+              </a:rPr>
+              <a:t>function </a:t>
+            </a:r>
+            <a:endParaRPr lang="en-US" sz="2400" dirty="0">
+              <a:latin typeface="Times New Roman" pitchFamily="18" charset="0"/>
+              <a:cs typeface="Times New Roman" pitchFamily="18" charset="0"/>
+            </a:endParaRPr>
           </a:p>
           <a:p>
             <a:r>
@@ -4258,17 +4307,56 @@
                 <a:latin typeface="Times New Roman" pitchFamily="18" charset="0"/>
                 <a:cs typeface="Times New Roman" pitchFamily="18" charset="0"/>
               </a:rPr>
-              <a:t>All the particle has certain velocities which directs the flying of the particles </a:t>
-            </a:r>
-          </a:p>
-          <a:p>
+              <a:t>All </a:t>
+            </a:r>
+            <a:r>
+              <a:rPr lang="en-US" sz="2400" dirty="0" smtClean="0">
+                <a:latin typeface="Times New Roman" pitchFamily="18" charset="0"/>
+                <a:cs typeface="Times New Roman" pitchFamily="18" charset="0"/>
+              </a:rPr>
+              <a:t>particles have </a:t>
+            </a:r>
             <a:r>
               <a:rPr lang="en-US" sz="2400" dirty="0">
                 <a:latin typeface="Times New Roman" pitchFamily="18" charset="0"/>
                 <a:cs typeface="Times New Roman" pitchFamily="18" charset="0"/>
               </a:rPr>
-              <a:t>Particles fly through the space by following the current optimum particles</a:t>
-            </a:r>
+              <a:t>certain velocities which </a:t>
+            </a:r>
+            <a:r>
+              <a:rPr lang="en-US" sz="2400" dirty="0" smtClean="0">
+                <a:latin typeface="Times New Roman" pitchFamily="18" charset="0"/>
+                <a:cs typeface="Times New Roman" pitchFamily="18" charset="0"/>
+              </a:rPr>
+              <a:t>direct </a:t>
+            </a:r>
+            <a:r>
+              <a:rPr lang="en-US" sz="2400" dirty="0">
+                <a:latin typeface="Times New Roman" pitchFamily="18" charset="0"/>
+                <a:cs typeface="Times New Roman" pitchFamily="18" charset="0"/>
+              </a:rPr>
+              <a:t>the flying of the particles </a:t>
+            </a:r>
+          </a:p>
+          <a:p>
+            <a:r>
+              <a:rPr lang="en-US" sz="2400" dirty="0">
+                <a:latin typeface="Times New Roman" pitchFamily="18" charset="0"/>
+                <a:cs typeface="Times New Roman" pitchFamily="18" charset="0"/>
+              </a:rPr>
+              <a:t>Particles fly through the space by following the current optimum </a:t>
+            </a:r>
+            <a:r>
+              <a:rPr lang="en-US" sz="2400" dirty="0" smtClean="0">
+                <a:latin typeface="Times New Roman" pitchFamily="18" charset="0"/>
+                <a:cs typeface="Times New Roman" pitchFamily="18" charset="0"/>
+              </a:rPr>
+              <a:t>particles (the global best)</a:t>
+            </a:r>
+            <a:endParaRPr lang="en-US" sz="2400" dirty="0">
+              <a:latin typeface="Times New Roman" pitchFamily="18" charset="0"/>
+              <a:cs typeface="Times New Roman" pitchFamily="18" charset="0"/>
+            </a:endParaRPr>
           </a:p>
         </p:txBody>
       </p:sp>
@@ -4376,47 +4464,20 @@
             </a:r>
           </a:p>
           <a:p>
-            <a:r>
-              <a:rPr lang="en-US" sz="2400" dirty="0">
-                <a:latin typeface="Times New Roman" pitchFamily="18" charset="0"/>
-                <a:cs typeface="Times New Roman" pitchFamily="18" charset="0"/>
-              </a:rPr>
-              <a:t>Basic algorithm as proposed by Kennedy and </a:t>
-            </a:r>
-            <a:r>
-              <a:rPr lang="en-US" sz="2400" dirty="0" err="1">
-                <a:latin typeface="Times New Roman" pitchFamily="18" charset="0"/>
-                <a:cs typeface="Times New Roman" pitchFamily="18" charset="0"/>
-              </a:rPr>
-              <a:t>Eberhart</a:t>
-            </a:r>
-            <a:r>
-              <a:rPr lang="en-US" sz="2400" dirty="0">
-                <a:latin typeface="Times New Roman" pitchFamily="18" charset="0"/>
-                <a:cs typeface="Times New Roman" pitchFamily="18" charset="0"/>
-              </a:rPr>
-              <a:t> (1995</a:t>
-            </a:r>
+            <a:pPr lvl="1"/>
             <a:r>
               <a:rPr lang="en-US" sz="2400" dirty="0" smtClean="0">
                 <a:latin typeface="Times New Roman" pitchFamily="18" charset="0"/>
                 <a:cs typeface="Times New Roman" pitchFamily="18" charset="0"/>
               </a:rPr>
-              <a:t>)</a:t>
-            </a:r>
-            <a:endParaRPr lang="en-US" sz="2400" b="1" u="sng" dirty="0" smtClean="0">
-              <a:latin typeface="Times New Roman" pitchFamily="18" charset="0"/>
-              <a:cs typeface="Times New Roman" pitchFamily="18" charset="0"/>
-            </a:endParaRPr>
-          </a:p>
-          <a:p>
-            <a:pPr lvl="1"/>
+              <a:t>It </a:t>
+            </a:r>
             <a:r>
               <a:rPr lang="en-US" sz="2400" dirty="0" smtClean="0">
                 <a:latin typeface="Times New Roman" pitchFamily="18" charset="0"/>
                 <a:cs typeface="Times New Roman" pitchFamily="18" charset="0"/>
               </a:rPr>
-              <a:t>It starts with a group of random particles.</a:t>
+              <a:t>starts with a group of random particles.</a:t>
             </a:r>
           </a:p>
           <a:p>
@@ -4614,7 +4675,28 @@
                 <a:latin typeface="Times New Roman" pitchFamily="18" charset="0"/>
                 <a:cs typeface="Times New Roman" pitchFamily="18" charset="0"/>
               </a:rPr>
-              <a:t>Position of individual particles updated as follows:</a:t>
+              <a:t>Next position </a:t>
+            </a:r>
+            <a:r>
+              <a:rPr lang="en-US" sz="2400" dirty="0" smtClean="0">
+                <a:latin typeface="Times New Roman" pitchFamily="18" charset="0"/>
+                <a:cs typeface="Times New Roman" pitchFamily="18" charset="0"/>
+              </a:rPr>
+              <a:t>of individual </a:t>
+            </a:r>
+            <a:r>
+              <a:rPr lang="en-US" sz="2400" dirty="0" smtClean="0">
+                <a:latin typeface="Times New Roman" pitchFamily="18" charset="0"/>
+                <a:cs typeface="Times New Roman" pitchFamily="18" charset="0"/>
+              </a:rPr>
+              <a:t>particles is </a:t>
+            </a:r>
+            <a:r>
+              <a:rPr lang="en-US" sz="2400" dirty="0" smtClean="0">
+                <a:latin typeface="Times New Roman" pitchFamily="18" charset="0"/>
+                <a:cs typeface="Times New Roman" pitchFamily="18" charset="0"/>
+              </a:rPr>
+              <a:t>updated as follows:</a:t>
             </a:r>
           </a:p>
           <a:p>
@@ -4635,12 +4717,26 @@
           </a:p>
           <a:p>
             <a:pPr lvl="1"/>
+            <a:endParaRPr lang="en-US" sz="2400" dirty="0" smtClean="0">
+              <a:latin typeface="Times New Roman" pitchFamily="18" charset="0"/>
+              <a:cs typeface="Times New Roman" pitchFamily="18" charset="0"/>
+            </a:endParaRPr>
+          </a:p>
+          <a:p>
+            <a:pPr lvl="1"/>
             <a:r>
               <a:rPr lang="en-US" sz="2400" dirty="0" smtClean="0">
                 <a:latin typeface="Times New Roman" pitchFamily="18" charset="0"/>
                 <a:cs typeface="Times New Roman" pitchFamily="18" charset="0"/>
               </a:rPr>
-              <a:t>With the velocity calculated as follows:</a:t>
+              <a:t>With </a:t>
+            </a:r>
+            <a:r>
+              <a:rPr lang="en-US" sz="2400" dirty="0" smtClean="0">
+                <a:latin typeface="Times New Roman" pitchFamily="18" charset="0"/>
+                <a:cs typeface="Times New Roman" pitchFamily="18" charset="0"/>
+              </a:rPr>
+              <a:t>the velocity calculated as follows:</a:t>
             </a:r>
             <a:endParaRPr lang="en-US" sz="2400" dirty="0">
               <a:latin typeface="Times New Roman" pitchFamily="18" charset="0"/>
@@ -4665,13 +4761,13 @@
               </a:ext>
             </a:extLst>
           </a:blip>
-          <a:srcRect l="30119" t="50085" r="35639" b="43662"/>
+          <a:srcRect l="30119" t="50085" r="50239" b="43662"/>
           <a:stretch/>
         </p:blipFill>
         <p:spPr>
           <a:xfrm>
-            <a:off x="921328" y="2387599"/>
-            <a:ext cx="5791200" cy="812801"/>
+            <a:off x="1524000" y="2819400"/>
+            <a:ext cx="5258521" cy="1171756"/>
           </a:xfrm>
           <a:prstGeom prst="rect">
             <a:avLst/>
@@ -4694,13 +4790,13 @@
               </a:ext>
             </a:extLst>
           </a:blip>
-          <a:srcRect l="24242" t="61184" r="28333" b="29384"/>
+          <a:srcRect l="31836" t="61184" r="36474" b="32921"/>
           <a:stretch/>
         </p:blipFill>
         <p:spPr>
           <a:xfrm>
-            <a:off x="0" y="3657600"/>
-            <a:ext cx="7620000" cy="1295400"/>
+            <a:off x="860453" y="4648200"/>
+            <a:ext cx="6585614" cy="873385"/>
           </a:xfrm>
           <a:prstGeom prst="rect">
             <a:avLst/>
@@ -4773,7 +4869,7 @@
           </p:cNvPicPr>
           <p:nvPr/>
         </p:nvPicPr>
-        <p:blipFill>
+        <p:blipFill rotWithShape="1">
           <a:blip r:embed="rId2">
             <a:extLst>
               <a:ext uri="{28A0092B-C50C-407E-A947-70E740481C1C}">
@@ -4781,14 +4877,13 @@
               </a:ext>
             </a:extLst>
           </a:blip>
-          <a:stretch>
-            <a:fillRect/>
-          </a:stretch>
+          <a:srcRect l="3333" r="13953"/>
+          <a:stretch/>
         </p:blipFill>
         <p:spPr>
           <a:xfrm>
-            <a:off x="0" y="1981200"/>
-            <a:ext cx="8458200" cy="2819400"/>
+            <a:off x="125673" y="2057400"/>
+            <a:ext cx="8130654" cy="3276600"/>
           </a:xfrm>
           <a:prstGeom prst="rect">
             <a:avLst/>
@@ -5000,8 +5095,8 @@
         </p:nvSpPr>
         <p:spPr>
           <a:xfrm>
-            <a:off x="479946" y="174508"/>
-            <a:ext cx="7620000" cy="1143000"/>
+            <a:off x="166048" y="235997"/>
+            <a:ext cx="7620000" cy="870442"/>
           </a:xfrm>
         </p:spPr>
         <p:txBody>
@@ -5009,10 +5104,10 @@
           <a:lstStyle/>
           <a:p>
             <a:r>
-              <a:rPr lang="en-US" dirty="0" smtClean="0"/>
+              <a:rPr lang="en-US" sz="4400" dirty="0" smtClean="0"/>
               <a:t>PSO Algorithm:</a:t>
             </a:r>
-            <a:endParaRPr lang="en-GB" dirty="0"/>
+            <a:endParaRPr lang="en-GB" sz="4400" dirty="0"/>
           </a:p>
         </p:txBody>
       </p:sp>
@@ -5040,7 +5135,7 @@
         </p:blipFill>
         <p:spPr>
           <a:xfrm>
-            <a:off x="503830" y="1219200"/>
+            <a:off x="257886" y="1317198"/>
             <a:ext cx="5455134" cy="4872843"/>
           </a:xfrm>
         </p:spPr>
@@ -5053,8 +5148,8 @@
         </p:nvSpPr>
         <p:spPr>
           <a:xfrm>
-            <a:off x="457200" y="6400800"/>
-            <a:ext cx="6553200" cy="292388"/>
+            <a:off x="166048" y="6537451"/>
+            <a:ext cx="6553200" cy="276999"/>
           </a:xfrm>
           <a:prstGeom prst="rect">
             <a:avLst/>
@@ -5068,12 +5163,968 @@
           <a:lstStyle/>
           <a:p>
             <a:r>
-              <a:rPr lang="en-GB" sz="1300" dirty="0">
+              <a:rPr lang="en-GB" sz="1200" dirty="0">
                 <a:hlinkClick r:id="rId3"/>
               </a:rPr>
               <a:t>https://www.researchgate.net/figure/The-pseudocode-of-the-PSO-algorithm_fig8_274460300</a:t>
             </a:r>
-            <a:endParaRPr lang="en-GB" sz="1300" dirty="0"/>
+            <a:endParaRPr lang="en-GB" sz="1200" dirty="0"/>
+          </a:p>
+        </p:txBody>
+      </p:sp>
+      <p:sp>
+        <p:nvSpPr>
+          <p:cNvPr id="8" name="Right Brace 7"/>
+          <p:cNvSpPr/>
+          <p:nvPr/>
+        </p:nvSpPr>
+        <p:spPr>
+          <a:xfrm>
+            <a:off x="5703922" y="1923642"/>
+            <a:ext cx="392078" cy="2224202"/>
+          </a:xfrm>
+          <a:custGeom>
+            <a:avLst/>
+            <a:gdLst>
+              <a:gd name="connsiteX0" fmla="*/ 0 w 762000"/>
+              <a:gd name="connsiteY0" fmla="*/ 0 h 4343400"/>
+              <a:gd name="connsiteX1" fmla="*/ 381000 w 762000"/>
+              <a:gd name="connsiteY1" fmla="*/ 63497 h 4343400"/>
+              <a:gd name="connsiteX2" fmla="*/ 381000 w 762000"/>
+              <a:gd name="connsiteY2" fmla="*/ 2108203 h 4343400"/>
+              <a:gd name="connsiteX3" fmla="*/ 762000 w 762000"/>
+              <a:gd name="connsiteY3" fmla="*/ 2171700 h 4343400"/>
+              <a:gd name="connsiteX4" fmla="*/ 381000 w 762000"/>
+              <a:gd name="connsiteY4" fmla="*/ 2235197 h 4343400"/>
+              <a:gd name="connsiteX5" fmla="*/ 381000 w 762000"/>
+              <a:gd name="connsiteY5" fmla="*/ 4279903 h 4343400"/>
+              <a:gd name="connsiteX6" fmla="*/ 0 w 762000"/>
+              <a:gd name="connsiteY6" fmla="*/ 4343400 h 4343400"/>
+              <a:gd name="connsiteX7" fmla="*/ 0 w 762000"/>
+              <a:gd name="connsiteY7" fmla="*/ 0 h 4343400"/>
+              <a:gd name="connsiteX0" fmla="*/ 0 w 762000"/>
+              <a:gd name="connsiteY0" fmla="*/ 0 h 4343400"/>
+              <a:gd name="connsiteX1" fmla="*/ 381000 w 762000"/>
+              <a:gd name="connsiteY1" fmla="*/ 63497 h 4343400"/>
+              <a:gd name="connsiteX2" fmla="*/ 381000 w 762000"/>
+              <a:gd name="connsiteY2" fmla="*/ 2108203 h 4343400"/>
+              <a:gd name="connsiteX3" fmla="*/ 762000 w 762000"/>
+              <a:gd name="connsiteY3" fmla="*/ 2171700 h 4343400"/>
+              <a:gd name="connsiteX4" fmla="*/ 381000 w 762000"/>
+              <a:gd name="connsiteY4" fmla="*/ 2235197 h 4343400"/>
+              <a:gd name="connsiteX5" fmla="*/ 381000 w 762000"/>
+              <a:gd name="connsiteY5" fmla="*/ 4279903 h 4343400"/>
+              <a:gd name="connsiteX6" fmla="*/ 0 w 762000"/>
+              <a:gd name="connsiteY6" fmla="*/ 4343400 h 4343400"/>
+              <a:gd name="connsiteX0" fmla="*/ 0 w 762000"/>
+              <a:gd name="connsiteY0" fmla="*/ 0 h 4343400"/>
+              <a:gd name="connsiteX1" fmla="*/ 381000 w 762000"/>
+              <a:gd name="connsiteY1" fmla="*/ 63497 h 4343400"/>
+              <a:gd name="connsiteX2" fmla="*/ 381000 w 762000"/>
+              <a:gd name="connsiteY2" fmla="*/ 2108203 h 4343400"/>
+              <a:gd name="connsiteX3" fmla="*/ 762000 w 762000"/>
+              <a:gd name="connsiteY3" fmla="*/ 2171700 h 4343400"/>
+              <a:gd name="connsiteX4" fmla="*/ 381000 w 762000"/>
+              <a:gd name="connsiteY4" fmla="*/ 2235197 h 4343400"/>
+              <a:gd name="connsiteX5" fmla="*/ 381000 w 762000"/>
+              <a:gd name="connsiteY5" fmla="*/ 4279903 h 4343400"/>
+              <a:gd name="connsiteX6" fmla="*/ 0 w 762000"/>
+              <a:gd name="connsiteY6" fmla="*/ 4343400 h 4343400"/>
+              <a:gd name="connsiteX7" fmla="*/ 0 w 762000"/>
+              <a:gd name="connsiteY7" fmla="*/ 0 h 4343400"/>
+              <a:gd name="connsiteX0" fmla="*/ 0 w 762000"/>
+              <a:gd name="connsiteY0" fmla="*/ 0 h 4343400"/>
+              <a:gd name="connsiteX1" fmla="*/ 381000 w 762000"/>
+              <a:gd name="connsiteY1" fmla="*/ 63497 h 4343400"/>
+              <a:gd name="connsiteX2" fmla="*/ 381000 w 762000"/>
+              <a:gd name="connsiteY2" fmla="*/ 2108203 h 4343400"/>
+              <a:gd name="connsiteX3" fmla="*/ 611875 w 762000"/>
+              <a:gd name="connsiteY3" fmla="*/ 2185348 h 4343400"/>
+              <a:gd name="connsiteX4" fmla="*/ 381000 w 762000"/>
+              <a:gd name="connsiteY4" fmla="*/ 2235197 h 4343400"/>
+              <a:gd name="connsiteX5" fmla="*/ 381000 w 762000"/>
+              <a:gd name="connsiteY5" fmla="*/ 4279903 h 4343400"/>
+              <a:gd name="connsiteX6" fmla="*/ 0 w 762000"/>
+              <a:gd name="connsiteY6" fmla="*/ 4343400 h 4343400"/>
+              <a:gd name="connsiteX0" fmla="*/ 0 w 762000"/>
+              <a:gd name="connsiteY0" fmla="*/ 0 h 4343400"/>
+              <a:gd name="connsiteX1" fmla="*/ 381000 w 762000"/>
+              <a:gd name="connsiteY1" fmla="*/ 63497 h 4343400"/>
+              <a:gd name="connsiteX2" fmla="*/ 381000 w 762000"/>
+              <a:gd name="connsiteY2" fmla="*/ 2108203 h 4343400"/>
+              <a:gd name="connsiteX3" fmla="*/ 762000 w 762000"/>
+              <a:gd name="connsiteY3" fmla="*/ 2171700 h 4343400"/>
+              <a:gd name="connsiteX4" fmla="*/ 381000 w 762000"/>
+              <a:gd name="connsiteY4" fmla="*/ 2235197 h 4343400"/>
+              <a:gd name="connsiteX5" fmla="*/ 381000 w 762000"/>
+              <a:gd name="connsiteY5" fmla="*/ 4279903 h 4343400"/>
+              <a:gd name="connsiteX6" fmla="*/ 0 w 762000"/>
+              <a:gd name="connsiteY6" fmla="*/ 4343400 h 4343400"/>
+              <a:gd name="connsiteX7" fmla="*/ 0 w 762000"/>
+              <a:gd name="connsiteY7" fmla="*/ 0 h 4343400"/>
+              <a:gd name="connsiteX0" fmla="*/ 0 w 762000"/>
+              <a:gd name="connsiteY0" fmla="*/ 0 h 4343400"/>
+              <a:gd name="connsiteX1" fmla="*/ 381000 w 762000"/>
+              <a:gd name="connsiteY1" fmla="*/ 63497 h 4343400"/>
+              <a:gd name="connsiteX2" fmla="*/ 381000 w 762000"/>
+              <a:gd name="connsiteY2" fmla="*/ 2108203 h 4343400"/>
+              <a:gd name="connsiteX3" fmla="*/ 611875 w 762000"/>
+              <a:gd name="connsiteY3" fmla="*/ 2185348 h 4343400"/>
+              <a:gd name="connsiteX4" fmla="*/ 381000 w 762000"/>
+              <a:gd name="connsiteY4" fmla="*/ 2235197 h 4343400"/>
+              <a:gd name="connsiteX5" fmla="*/ 381000 w 762000"/>
+              <a:gd name="connsiteY5" fmla="*/ 4279903 h 4343400"/>
+              <a:gd name="connsiteX6" fmla="*/ 0 w 762000"/>
+              <a:gd name="connsiteY6" fmla="*/ 4343400 h 4343400"/>
+              <a:gd name="connsiteX0" fmla="*/ 0 w 762000"/>
+              <a:gd name="connsiteY0" fmla="*/ 0 h 4343400"/>
+              <a:gd name="connsiteX1" fmla="*/ 381000 w 762000"/>
+              <a:gd name="connsiteY1" fmla="*/ 63497 h 4343400"/>
+              <a:gd name="connsiteX2" fmla="*/ 381000 w 762000"/>
+              <a:gd name="connsiteY2" fmla="*/ 2108203 h 4343400"/>
+              <a:gd name="connsiteX3" fmla="*/ 762000 w 762000"/>
+              <a:gd name="connsiteY3" fmla="*/ 2171700 h 4343400"/>
+              <a:gd name="connsiteX4" fmla="*/ 381000 w 762000"/>
+              <a:gd name="connsiteY4" fmla="*/ 2235197 h 4343400"/>
+              <a:gd name="connsiteX5" fmla="*/ 381000 w 762000"/>
+              <a:gd name="connsiteY5" fmla="*/ 4279903 h 4343400"/>
+              <a:gd name="connsiteX6" fmla="*/ 0 w 762000"/>
+              <a:gd name="connsiteY6" fmla="*/ 4343400 h 4343400"/>
+              <a:gd name="connsiteX7" fmla="*/ 0 w 762000"/>
+              <a:gd name="connsiteY7" fmla="*/ 0 h 4343400"/>
+              <a:gd name="connsiteX0" fmla="*/ 0 w 762000"/>
+              <a:gd name="connsiteY0" fmla="*/ 0 h 4343400"/>
+              <a:gd name="connsiteX1" fmla="*/ 381000 w 762000"/>
+              <a:gd name="connsiteY1" fmla="*/ 63497 h 4343400"/>
+              <a:gd name="connsiteX2" fmla="*/ 381000 w 762000"/>
+              <a:gd name="connsiteY2" fmla="*/ 2108203 h 4343400"/>
+              <a:gd name="connsiteX3" fmla="*/ 611875 w 762000"/>
+              <a:gd name="connsiteY3" fmla="*/ 2185348 h 4343400"/>
+              <a:gd name="connsiteX4" fmla="*/ 381000 w 762000"/>
+              <a:gd name="connsiteY4" fmla="*/ 2235197 h 4343400"/>
+              <a:gd name="connsiteX5" fmla="*/ 381000 w 762000"/>
+              <a:gd name="connsiteY5" fmla="*/ 4279903 h 4343400"/>
+              <a:gd name="connsiteX6" fmla="*/ 95534 w 762000"/>
+              <a:gd name="connsiteY6" fmla="*/ 4329753 h 4343400"/>
+              <a:gd name="connsiteX0" fmla="*/ 0 w 762000"/>
+              <a:gd name="connsiteY0" fmla="*/ 0 h 4343400"/>
+              <a:gd name="connsiteX1" fmla="*/ 381000 w 762000"/>
+              <a:gd name="connsiteY1" fmla="*/ 63497 h 4343400"/>
+              <a:gd name="connsiteX2" fmla="*/ 381000 w 762000"/>
+              <a:gd name="connsiteY2" fmla="*/ 2108203 h 4343400"/>
+              <a:gd name="connsiteX3" fmla="*/ 762000 w 762000"/>
+              <a:gd name="connsiteY3" fmla="*/ 2171700 h 4343400"/>
+              <a:gd name="connsiteX4" fmla="*/ 381000 w 762000"/>
+              <a:gd name="connsiteY4" fmla="*/ 2235197 h 4343400"/>
+              <a:gd name="connsiteX5" fmla="*/ 381000 w 762000"/>
+              <a:gd name="connsiteY5" fmla="*/ 4279903 h 4343400"/>
+              <a:gd name="connsiteX6" fmla="*/ 0 w 762000"/>
+              <a:gd name="connsiteY6" fmla="*/ 4343400 h 4343400"/>
+              <a:gd name="connsiteX7" fmla="*/ 0 w 762000"/>
+              <a:gd name="connsiteY7" fmla="*/ 0 h 4343400"/>
+              <a:gd name="connsiteX0" fmla="*/ 95534 w 762000"/>
+              <a:gd name="connsiteY0" fmla="*/ 40943 h 4343400"/>
+              <a:gd name="connsiteX1" fmla="*/ 381000 w 762000"/>
+              <a:gd name="connsiteY1" fmla="*/ 63497 h 4343400"/>
+              <a:gd name="connsiteX2" fmla="*/ 381000 w 762000"/>
+              <a:gd name="connsiteY2" fmla="*/ 2108203 h 4343400"/>
+              <a:gd name="connsiteX3" fmla="*/ 611875 w 762000"/>
+              <a:gd name="connsiteY3" fmla="*/ 2185348 h 4343400"/>
+              <a:gd name="connsiteX4" fmla="*/ 381000 w 762000"/>
+              <a:gd name="connsiteY4" fmla="*/ 2235197 h 4343400"/>
+              <a:gd name="connsiteX5" fmla="*/ 381000 w 762000"/>
+              <a:gd name="connsiteY5" fmla="*/ 4279903 h 4343400"/>
+              <a:gd name="connsiteX6" fmla="*/ 95534 w 762000"/>
+              <a:gd name="connsiteY6" fmla="*/ 4329753 h 4343400"/>
+              <a:gd name="connsiteX0" fmla="*/ 0 w 762000"/>
+              <a:gd name="connsiteY0" fmla="*/ 0 h 4343400"/>
+              <a:gd name="connsiteX1" fmla="*/ 381000 w 762000"/>
+              <a:gd name="connsiteY1" fmla="*/ 63497 h 4343400"/>
+              <a:gd name="connsiteX2" fmla="*/ 381000 w 762000"/>
+              <a:gd name="connsiteY2" fmla="*/ 2108203 h 4343400"/>
+              <a:gd name="connsiteX3" fmla="*/ 762000 w 762000"/>
+              <a:gd name="connsiteY3" fmla="*/ 2171700 h 4343400"/>
+              <a:gd name="connsiteX4" fmla="*/ 381000 w 762000"/>
+              <a:gd name="connsiteY4" fmla="*/ 2235197 h 4343400"/>
+              <a:gd name="connsiteX5" fmla="*/ 381000 w 762000"/>
+              <a:gd name="connsiteY5" fmla="*/ 4279903 h 4343400"/>
+              <a:gd name="connsiteX6" fmla="*/ 0 w 762000"/>
+              <a:gd name="connsiteY6" fmla="*/ 4343400 h 4343400"/>
+              <a:gd name="connsiteX7" fmla="*/ 0 w 762000"/>
+              <a:gd name="connsiteY7" fmla="*/ 0 h 4343400"/>
+              <a:gd name="connsiteX0" fmla="*/ 95534 w 762000"/>
+              <a:gd name="connsiteY0" fmla="*/ 40943 h 4343400"/>
+              <a:gd name="connsiteX1" fmla="*/ 381000 w 762000"/>
+              <a:gd name="connsiteY1" fmla="*/ 63497 h 4343400"/>
+              <a:gd name="connsiteX2" fmla="*/ 381000 w 762000"/>
+              <a:gd name="connsiteY2" fmla="*/ 2108203 h 4343400"/>
+              <a:gd name="connsiteX3" fmla="*/ 611875 w 762000"/>
+              <a:gd name="connsiteY3" fmla="*/ 2185348 h 4343400"/>
+              <a:gd name="connsiteX4" fmla="*/ 381000 w 762000"/>
+              <a:gd name="connsiteY4" fmla="*/ 2276140 h 4343400"/>
+              <a:gd name="connsiteX5" fmla="*/ 381000 w 762000"/>
+              <a:gd name="connsiteY5" fmla="*/ 4279903 h 4343400"/>
+              <a:gd name="connsiteX6" fmla="*/ 95534 w 762000"/>
+              <a:gd name="connsiteY6" fmla="*/ 4329753 h 4343400"/>
+              <a:gd name="connsiteX0" fmla="*/ 0 w 762000"/>
+              <a:gd name="connsiteY0" fmla="*/ 0 h 4343400"/>
+              <a:gd name="connsiteX1" fmla="*/ 381000 w 762000"/>
+              <a:gd name="connsiteY1" fmla="*/ 63497 h 4343400"/>
+              <a:gd name="connsiteX2" fmla="*/ 381000 w 762000"/>
+              <a:gd name="connsiteY2" fmla="*/ 2108203 h 4343400"/>
+              <a:gd name="connsiteX3" fmla="*/ 762000 w 762000"/>
+              <a:gd name="connsiteY3" fmla="*/ 2171700 h 4343400"/>
+              <a:gd name="connsiteX4" fmla="*/ 381000 w 762000"/>
+              <a:gd name="connsiteY4" fmla="*/ 2235197 h 4343400"/>
+              <a:gd name="connsiteX5" fmla="*/ 381000 w 762000"/>
+              <a:gd name="connsiteY5" fmla="*/ 4279903 h 4343400"/>
+              <a:gd name="connsiteX6" fmla="*/ 0 w 762000"/>
+              <a:gd name="connsiteY6" fmla="*/ 4343400 h 4343400"/>
+              <a:gd name="connsiteX7" fmla="*/ 0 w 762000"/>
+              <a:gd name="connsiteY7" fmla="*/ 0 h 4343400"/>
+              <a:gd name="connsiteX0" fmla="*/ 95534 w 762000"/>
+              <a:gd name="connsiteY0" fmla="*/ 40943 h 4343400"/>
+              <a:gd name="connsiteX1" fmla="*/ 381000 w 762000"/>
+              <a:gd name="connsiteY1" fmla="*/ 63497 h 4343400"/>
+              <a:gd name="connsiteX2" fmla="*/ 381000 w 762000"/>
+              <a:gd name="connsiteY2" fmla="*/ 2053612 h 4343400"/>
+              <a:gd name="connsiteX3" fmla="*/ 611875 w 762000"/>
+              <a:gd name="connsiteY3" fmla="*/ 2185348 h 4343400"/>
+              <a:gd name="connsiteX4" fmla="*/ 381000 w 762000"/>
+              <a:gd name="connsiteY4" fmla="*/ 2276140 h 4343400"/>
+              <a:gd name="connsiteX5" fmla="*/ 381000 w 762000"/>
+              <a:gd name="connsiteY5" fmla="*/ 4279903 h 4343400"/>
+              <a:gd name="connsiteX6" fmla="*/ 95534 w 762000"/>
+              <a:gd name="connsiteY6" fmla="*/ 4329753 h 4343400"/>
+              <a:gd name="connsiteX0" fmla="*/ 0 w 762000"/>
+              <a:gd name="connsiteY0" fmla="*/ 0 h 4343400"/>
+              <a:gd name="connsiteX1" fmla="*/ 381000 w 762000"/>
+              <a:gd name="connsiteY1" fmla="*/ 63497 h 4343400"/>
+              <a:gd name="connsiteX2" fmla="*/ 381000 w 762000"/>
+              <a:gd name="connsiteY2" fmla="*/ 2108203 h 4343400"/>
+              <a:gd name="connsiteX3" fmla="*/ 762000 w 762000"/>
+              <a:gd name="connsiteY3" fmla="*/ 2171700 h 4343400"/>
+              <a:gd name="connsiteX4" fmla="*/ 381000 w 762000"/>
+              <a:gd name="connsiteY4" fmla="*/ 2235197 h 4343400"/>
+              <a:gd name="connsiteX5" fmla="*/ 381000 w 762000"/>
+              <a:gd name="connsiteY5" fmla="*/ 4279903 h 4343400"/>
+              <a:gd name="connsiteX6" fmla="*/ 0 w 762000"/>
+              <a:gd name="connsiteY6" fmla="*/ 4343400 h 4343400"/>
+              <a:gd name="connsiteX7" fmla="*/ 0 w 762000"/>
+              <a:gd name="connsiteY7" fmla="*/ 0 h 4343400"/>
+              <a:gd name="connsiteX0" fmla="*/ 95534 w 762000"/>
+              <a:gd name="connsiteY0" fmla="*/ 40943 h 4343400"/>
+              <a:gd name="connsiteX1" fmla="*/ 340057 w 762000"/>
+              <a:gd name="connsiteY1" fmla="*/ 104440 h 4343400"/>
+              <a:gd name="connsiteX2" fmla="*/ 381000 w 762000"/>
+              <a:gd name="connsiteY2" fmla="*/ 2053612 h 4343400"/>
+              <a:gd name="connsiteX3" fmla="*/ 611875 w 762000"/>
+              <a:gd name="connsiteY3" fmla="*/ 2185348 h 4343400"/>
+              <a:gd name="connsiteX4" fmla="*/ 381000 w 762000"/>
+              <a:gd name="connsiteY4" fmla="*/ 2276140 h 4343400"/>
+              <a:gd name="connsiteX5" fmla="*/ 381000 w 762000"/>
+              <a:gd name="connsiteY5" fmla="*/ 4279903 h 4343400"/>
+              <a:gd name="connsiteX6" fmla="*/ 95534 w 762000"/>
+              <a:gd name="connsiteY6" fmla="*/ 4329753 h 4343400"/>
+              <a:gd name="connsiteX0" fmla="*/ 0 w 762000"/>
+              <a:gd name="connsiteY0" fmla="*/ 0 h 4343400"/>
+              <a:gd name="connsiteX1" fmla="*/ 381000 w 762000"/>
+              <a:gd name="connsiteY1" fmla="*/ 63497 h 4343400"/>
+              <a:gd name="connsiteX2" fmla="*/ 381000 w 762000"/>
+              <a:gd name="connsiteY2" fmla="*/ 2108203 h 4343400"/>
+              <a:gd name="connsiteX3" fmla="*/ 762000 w 762000"/>
+              <a:gd name="connsiteY3" fmla="*/ 2171700 h 4343400"/>
+              <a:gd name="connsiteX4" fmla="*/ 381000 w 762000"/>
+              <a:gd name="connsiteY4" fmla="*/ 2235197 h 4343400"/>
+              <a:gd name="connsiteX5" fmla="*/ 381000 w 762000"/>
+              <a:gd name="connsiteY5" fmla="*/ 4279903 h 4343400"/>
+              <a:gd name="connsiteX6" fmla="*/ 0 w 762000"/>
+              <a:gd name="connsiteY6" fmla="*/ 4343400 h 4343400"/>
+              <a:gd name="connsiteX7" fmla="*/ 0 w 762000"/>
+              <a:gd name="connsiteY7" fmla="*/ 0 h 4343400"/>
+              <a:gd name="connsiteX0" fmla="*/ 95534 w 762000"/>
+              <a:gd name="connsiteY0" fmla="*/ 40943 h 4343400"/>
+              <a:gd name="connsiteX1" fmla="*/ 340057 w 762000"/>
+              <a:gd name="connsiteY1" fmla="*/ 104440 h 4343400"/>
+              <a:gd name="connsiteX2" fmla="*/ 381000 w 762000"/>
+              <a:gd name="connsiteY2" fmla="*/ 2053612 h 4343400"/>
+              <a:gd name="connsiteX3" fmla="*/ 611875 w 762000"/>
+              <a:gd name="connsiteY3" fmla="*/ 2185348 h 4343400"/>
+              <a:gd name="connsiteX4" fmla="*/ 381000 w 762000"/>
+              <a:gd name="connsiteY4" fmla="*/ 2276140 h 4343400"/>
+              <a:gd name="connsiteX5" fmla="*/ 312762 w 762000"/>
+              <a:gd name="connsiteY5" fmla="*/ 4252607 h 4343400"/>
+              <a:gd name="connsiteX6" fmla="*/ 95534 w 762000"/>
+              <a:gd name="connsiteY6" fmla="*/ 4329753 h 4343400"/>
+            </a:gdLst>
+            <a:ahLst/>
+            <a:cxnLst>
+              <a:cxn ang="0">
+                <a:pos x="connsiteX0" y="connsiteY0"/>
+              </a:cxn>
+              <a:cxn ang="0">
+                <a:pos x="connsiteX1" y="connsiteY1"/>
+              </a:cxn>
+              <a:cxn ang="0">
+                <a:pos x="connsiteX2" y="connsiteY2"/>
+              </a:cxn>
+              <a:cxn ang="0">
+                <a:pos x="connsiteX3" y="connsiteY3"/>
+              </a:cxn>
+              <a:cxn ang="0">
+                <a:pos x="connsiteX4" y="connsiteY4"/>
+              </a:cxn>
+              <a:cxn ang="0">
+                <a:pos x="connsiteX5" y="connsiteY5"/>
+              </a:cxn>
+              <a:cxn ang="0">
+                <a:pos x="connsiteX6" y="connsiteY6"/>
+              </a:cxn>
+            </a:cxnLst>
+            <a:rect l="l" t="t" r="r" b="b"/>
+            <a:pathLst>
+              <a:path w="762000" h="4343400" stroke="0" extrusionOk="0">
+                <a:moveTo>
+                  <a:pt x="0" y="0"/>
+                </a:moveTo>
+                <a:cubicBezTo>
+                  <a:pt x="210420" y="0"/>
+                  <a:pt x="381000" y="28429"/>
+                  <a:pt x="381000" y="63497"/>
+                </a:cubicBezTo>
+                <a:lnTo>
+                  <a:pt x="381000" y="2108203"/>
+                </a:lnTo>
+                <a:cubicBezTo>
+                  <a:pt x="381000" y="2143271"/>
+                  <a:pt x="551580" y="2171700"/>
+                  <a:pt x="762000" y="2171700"/>
+                </a:cubicBezTo>
+                <a:cubicBezTo>
+                  <a:pt x="551580" y="2171700"/>
+                  <a:pt x="381000" y="2200129"/>
+                  <a:pt x="381000" y="2235197"/>
+                </a:cubicBezTo>
+                <a:lnTo>
+                  <a:pt x="381000" y="4279903"/>
+                </a:lnTo>
+                <a:cubicBezTo>
+                  <a:pt x="381000" y="4314971"/>
+                  <a:pt x="210420" y="4343400"/>
+                  <a:pt x="0" y="4343400"/>
+                </a:cubicBezTo>
+                <a:lnTo>
+                  <a:pt x="0" y="0"/>
+                </a:lnTo>
+                <a:close/>
+              </a:path>
+              <a:path w="762000" h="4343400" fill="none">
+                <a:moveTo>
+                  <a:pt x="95534" y="40943"/>
+                </a:moveTo>
+                <a:cubicBezTo>
+                  <a:pt x="305954" y="40943"/>
+                  <a:pt x="340057" y="69372"/>
+                  <a:pt x="340057" y="104440"/>
+                </a:cubicBezTo>
+                <a:lnTo>
+                  <a:pt x="381000" y="2053612"/>
+                </a:lnTo>
+                <a:cubicBezTo>
+                  <a:pt x="381000" y="2088680"/>
+                  <a:pt x="611875" y="2148260"/>
+                  <a:pt x="611875" y="2185348"/>
+                </a:cubicBezTo>
+                <a:cubicBezTo>
+                  <a:pt x="611875" y="2222436"/>
+                  <a:pt x="381000" y="2241072"/>
+                  <a:pt x="381000" y="2276140"/>
+                </a:cubicBezTo>
+                <a:lnTo>
+                  <a:pt x="312762" y="4252607"/>
+                </a:lnTo>
+                <a:cubicBezTo>
+                  <a:pt x="312762" y="4287675"/>
+                  <a:pt x="305954" y="4329753"/>
+                  <a:pt x="95534" y="4329753"/>
+                </a:cubicBezTo>
+              </a:path>
+            </a:pathLst>
+          </a:custGeom>
+          <a:ln w="38100">
+            <a:solidFill>
+              <a:schemeClr val="tx1"/>
+            </a:solidFill>
+          </a:ln>
+        </p:spPr>
+        <p:style>
+          <a:lnRef idx="1">
+            <a:schemeClr val="accent1"/>
+          </a:lnRef>
+          <a:fillRef idx="0">
+            <a:schemeClr val="accent1"/>
+          </a:fillRef>
+          <a:effectRef idx="0">
+            <a:schemeClr val="accent1"/>
+          </a:effectRef>
+          <a:fontRef idx="minor">
+            <a:schemeClr val="tx1"/>
+          </a:fontRef>
+        </p:style>
+        <p:txBody>
+          <a:bodyPr rtlCol="0" anchor="ctr"/>
+          <a:lstStyle/>
+          <a:p>
+            <a:pPr algn="ctr"/>
+            <a:endParaRPr lang="en-GB"/>
+          </a:p>
+        </p:txBody>
+      </p:sp>
+      <p:sp>
+        <p:nvSpPr>
+          <p:cNvPr id="9" name="Right Brace 7"/>
+          <p:cNvSpPr/>
+          <p:nvPr/>
+        </p:nvSpPr>
+        <p:spPr>
+          <a:xfrm>
+            <a:off x="5703923" y="4498645"/>
+            <a:ext cx="392078" cy="1084952"/>
+          </a:xfrm>
+          <a:custGeom>
+            <a:avLst/>
+            <a:gdLst>
+              <a:gd name="connsiteX0" fmla="*/ 0 w 762000"/>
+              <a:gd name="connsiteY0" fmla="*/ 0 h 4343400"/>
+              <a:gd name="connsiteX1" fmla="*/ 381000 w 762000"/>
+              <a:gd name="connsiteY1" fmla="*/ 63497 h 4343400"/>
+              <a:gd name="connsiteX2" fmla="*/ 381000 w 762000"/>
+              <a:gd name="connsiteY2" fmla="*/ 2108203 h 4343400"/>
+              <a:gd name="connsiteX3" fmla="*/ 762000 w 762000"/>
+              <a:gd name="connsiteY3" fmla="*/ 2171700 h 4343400"/>
+              <a:gd name="connsiteX4" fmla="*/ 381000 w 762000"/>
+              <a:gd name="connsiteY4" fmla="*/ 2235197 h 4343400"/>
+              <a:gd name="connsiteX5" fmla="*/ 381000 w 762000"/>
+              <a:gd name="connsiteY5" fmla="*/ 4279903 h 4343400"/>
+              <a:gd name="connsiteX6" fmla="*/ 0 w 762000"/>
+              <a:gd name="connsiteY6" fmla="*/ 4343400 h 4343400"/>
+              <a:gd name="connsiteX7" fmla="*/ 0 w 762000"/>
+              <a:gd name="connsiteY7" fmla="*/ 0 h 4343400"/>
+              <a:gd name="connsiteX0" fmla="*/ 0 w 762000"/>
+              <a:gd name="connsiteY0" fmla="*/ 0 h 4343400"/>
+              <a:gd name="connsiteX1" fmla="*/ 381000 w 762000"/>
+              <a:gd name="connsiteY1" fmla="*/ 63497 h 4343400"/>
+              <a:gd name="connsiteX2" fmla="*/ 381000 w 762000"/>
+              <a:gd name="connsiteY2" fmla="*/ 2108203 h 4343400"/>
+              <a:gd name="connsiteX3" fmla="*/ 762000 w 762000"/>
+              <a:gd name="connsiteY3" fmla="*/ 2171700 h 4343400"/>
+              <a:gd name="connsiteX4" fmla="*/ 381000 w 762000"/>
+              <a:gd name="connsiteY4" fmla="*/ 2235197 h 4343400"/>
+              <a:gd name="connsiteX5" fmla="*/ 381000 w 762000"/>
+              <a:gd name="connsiteY5" fmla="*/ 4279903 h 4343400"/>
+              <a:gd name="connsiteX6" fmla="*/ 0 w 762000"/>
+              <a:gd name="connsiteY6" fmla="*/ 4343400 h 4343400"/>
+              <a:gd name="connsiteX0" fmla="*/ 0 w 762000"/>
+              <a:gd name="connsiteY0" fmla="*/ 0 h 4343400"/>
+              <a:gd name="connsiteX1" fmla="*/ 381000 w 762000"/>
+              <a:gd name="connsiteY1" fmla="*/ 63497 h 4343400"/>
+              <a:gd name="connsiteX2" fmla="*/ 381000 w 762000"/>
+              <a:gd name="connsiteY2" fmla="*/ 2108203 h 4343400"/>
+              <a:gd name="connsiteX3" fmla="*/ 762000 w 762000"/>
+              <a:gd name="connsiteY3" fmla="*/ 2171700 h 4343400"/>
+              <a:gd name="connsiteX4" fmla="*/ 381000 w 762000"/>
+              <a:gd name="connsiteY4" fmla="*/ 2235197 h 4343400"/>
+              <a:gd name="connsiteX5" fmla="*/ 381000 w 762000"/>
+              <a:gd name="connsiteY5" fmla="*/ 4279903 h 4343400"/>
+              <a:gd name="connsiteX6" fmla="*/ 0 w 762000"/>
+              <a:gd name="connsiteY6" fmla="*/ 4343400 h 4343400"/>
+              <a:gd name="connsiteX7" fmla="*/ 0 w 762000"/>
+              <a:gd name="connsiteY7" fmla="*/ 0 h 4343400"/>
+              <a:gd name="connsiteX0" fmla="*/ 0 w 762000"/>
+              <a:gd name="connsiteY0" fmla="*/ 0 h 4343400"/>
+              <a:gd name="connsiteX1" fmla="*/ 381000 w 762000"/>
+              <a:gd name="connsiteY1" fmla="*/ 63497 h 4343400"/>
+              <a:gd name="connsiteX2" fmla="*/ 381000 w 762000"/>
+              <a:gd name="connsiteY2" fmla="*/ 2108203 h 4343400"/>
+              <a:gd name="connsiteX3" fmla="*/ 611875 w 762000"/>
+              <a:gd name="connsiteY3" fmla="*/ 2185348 h 4343400"/>
+              <a:gd name="connsiteX4" fmla="*/ 381000 w 762000"/>
+              <a:gd name="connsiteY4" fmla="*/ 2235197 h 4343400"/>
+              <a:gd name="connsiteX5" fmla="*/ 381000 w 762000"/>
+              <a:gd name="connsiteY5" fmla="*/ 4279903 h 4343400"/>
+              <a:gd name="connsiteX6" fmla="*/ 0 w 762000"/>
+              <a:gd name="connsiteY6" fmla="*/ 4343400 h 4343400"/>
+              <a:gd name="connsiteX0" fmla="*/ 0 w 762000"/>
+              <a:gd name="connsiteY0" fmla="*/ 0 h 4343400"/>
+              <a:gd name="connsiteX1" fmla="*/ 381000 w 762000"/>
+              <a:gd name="connsiteY1" fmla="*/ 63497 h 4343400"/>
+              <a:gd name="connsiteX2" fmla="*/ 381000 w 762000"/>
+              <a:gd name="connsiteY2" fmla="*/ 2108203 h 4343400"/>
+              <a:gd name="connsiteX3" fmla="*/ 762000 w 762000"/>
+              <a:gd name="connsiteY3" fmla="*/ 2171700 h 4343400"/>
+              <a:gd name="connsiteX4" fmla="*/ 381000 w 762000"/>
+              <a:gd name="connsiteY4" fmla="*/ 2235197 h 4343400"/>
+              <a:gd name="connsiteX5" fmla="*/ 381000 w 762000"/>
+              <a:gd name="connsiteY5" fmla="*/ 4279903 h 4343400"/>
+              <a:gd name="connsiteX6" fmla="*/ 0 w 762000"/>
+              <a:gd name="connsiteY6" fmla="*/ 4343400 h 4343400"/>
+              <a:gd name="connsiteX7" fmla="*/ 0 w 762000"/>
+              <a:gd name="connsiteY7" fmla="*/ 0 h 4343400"/>
+              <a:gd name="connsiteX0" fmla="*/ 0 w 762000"/>
+              <a:gd name="connsiteY0" fmla="*/ 0 h 4343400"/>
+              <a:gd name="connsiteX1" fmla="*/ 381000 w 762000"/>
+              <a:gd name="connsiteY1" fmla="*/ 63497 h 4343400"/>
+              <a:gd name="connsiteX2" fmla="*/ 381000 w 762000"/>
+              <a:gd name="connsiteY2" fmla="*/ 2108203 h 4343400"/>
+              <a:gd name="connsiteX3" fmla="*/ 611875 w 762000"/>
+              <a:gd name="connsiteY3" fmla="*/ 2185348 h 4343400"/>
+              <a:gd name="connsiteX4" fmla="*/ 381000 w 762000"/>
+              <a:gd name="connsiteY4" fmla="*/ 2235197 h 4343400"/>
+              <a:gd name="connsiteX5" fmla="*/ 381000 w 762000"/>
+              <a:gd name="connsiteY5" fmla="*/ 4279903 h 4343400"/>
+              <a:gd name="connsiteX6" fmla="*/ 0 w 762000"/>
+              <a:gd name="connsiteY6" fmla="*/ 4343400 h 4343400"/>
+              <a:gd name="connsiteX0" fmla="*/ 0 w 762000"/>
+              <a:gd name="connsiteY0" fmla="*/ 0 h 4343400"/>
+              <a:gd name="connsiteX1" fmla="*/ 381000 w 762000"/>
+              <a:gd name="connsiteY1" fmla="*/ 63497 h 4343400"/>
+              <a:gd name="connsiteX2" fmla="*/ 381000 w 762000"/>
+              <a:gd name="connsiteY2" fmla="*/ 2108203 h 4343400"/>
+              <a:gd name="connsiteX3" fmla="*/ 762000 w 762000"/>
+              <a:gd name="connsiteY3" fmla="*/ 2171700 h 4343400"/>
+              <a:gd name="connsiteX4" fmla="*/ 381000 w 762000"/>
+              <a:gd name="connsiteY4" fmla="*/ 2235197 h 4343400"/>
+              <a:gd name="connsiteX5" fmla="*/ 381000 w 762000"/>
+              <a:gd name="connsiteY5" fmla="*/ 4279903 h 4343400"/>
+              <a:gd name="connsiteX6" fmla="*/ 0 w 762000"/>
+              <a:gd name="connsiteY6" fmla="*/ 4343400 h 4343400"/>
+              <a:gd name="connsiteX7" fmla="*/ 0 w 762000"/>
+              <a:gd name="connsiteY7" fmla="*/ 0 h 4343400"/>
+              <a:gd name="connsiteX0" fmla="*/ 0 w 762000"/>
+              <a:gd name="connsiteY0" fmla="*/ 0 h 4343400"/>
+              <a:gd name="connsiteX1" fmla="*/ 381000 w 762000"/>
+              <a:gd name="connsiteY1" fmla="*/ 63497 h 4343400"/>
+              <a:gd name="connsiteX2" fmla="*/ 381000 w 762000"/>
+              <a:gd name="connsiteY2" fmla="*/ 2108203 h 4343400"/>
+              <a:gd name="connsiteX3" fmla="*/ 611875 w 762000"/>
+              <a:gd name="connsiteY3" fmla="*/ 2185348 h 4343400"/>
+              <a:gd name="connsiteX4" fmla="*/ 381000 w 762000"/>
+              <a:gd name="connsiteY4" fmla="*/ 2235197 h 4343400"/>
+              <a:gd name="connsiteX5" fmla="*/ 381000 w 762000"/>
+              <a:gd name="connsiteY5" fmla="*/ 4279903 h 4343400"/>
+              <a:gd name="connsiteX6" fmla="*/ 95534 w 762000"/>
+              <a:gd name="connsiteY6" fmla="*/ 4329753 h 4343400"/>
+              <a:gd name="connsiteX0" fmla="*/ 0 w 762000"/>
+              <a:gd name="connsiteY0" fmla="*/ 0 h 4343400"/>
+              <a:gd name="connsiteX1" fmla="*/ 381000 w 762000"/>
+              <a:gd name="connsiteY1" fmla="*/ 63497 h 4343400"/>
+              <a:gd name="connsiteX2" fmla="*/ 381000 w 762000"/>
+              <a:gd name="connsiteY2" fmla="*/ 2108203 h 4343400"/>
+              <a:gd name="connsiteX3" fmla="*/ 762000 w 762000"/>
+              <a:gd name="connsiteY3" fmla="*/ 2171700 h 4343400"/>
+              <a:gd name="connsiteX4" fmla="*/ 381000 w 762000"/>
+              <a:gd name="connsiteY4" fmla="*/ 2235197 h 4343400"/>
+              <a:gd name="connsiteX5" fmla="*/ 381000 w 762000"/>
+              <a:gd name="connsiteY5" fmla="*/ 4279903 h 4343400"/>
+              <a:gd name="connsiteX6" fmla="*/ 0 w 762000"/>
+              <a:gd name="connsiteY6" fmla="*/ 4343400 h 4343400"/>
+              <a:gd name="connsiteX7" fmla="*/ 0 w 762000"/>
+              <a:gd name="connsiteY7" fmla="*/ 0 h 4343400"/>
+              <a:gd name="connsiteX0" fmla="*/ 95534 w 762000"/>
+              <a:gd name="connsiteY0" fmla="*/ 40943 h 4343400"/>
+              <a:gd name="connsiteX1" fmla="*/ 381000 w 762000"/>
+              <a:gd name="connsiteY1" fmla="*/ 63497 h 4343400"/>
+              <a:gd name="connsiteX2" fmla="*/ 381000 w 762000"/>
+              <a:gd name="connsiteY2" fmla="*/ 2108203 h 4343400"/>
+              <a:gd name="connsiteX3" fmla="*/ 611875 w 762000"/>
+              <a:gd name="connsiteY3" fmla="*/ 2185348 h 4343400"/>
+              <a:gd name="connsiteX4" fmla="*/ 381000 w 762000"/>
+              <a:gd name="connsiteY4" fmla="*/ 2235197 h 4343400"/>
+              <a:gd name="connsiteX5" fmla="*/ 381000 w 762000"/>
+              <a:gd name="connsiteY5" fmla="*/ 4279903 h 4343400"/>
+              <a:gd name="connsiteX6" fmla="*/ 95534 w 762000"/>
+              <a:gd name="connsiteY6" fmla="*/ 4329753 h 4343400"/>
+              <a:gd name="connsiteX0" fmla="*/ 0 w 762000"/>
+              <a:gd name="connsiteY0" fmla="*/ 0 h 4343400"/>
+              <a:gd name="connsiteX1" fmla="*/ 381000 w 762000"/>
+              <a:gd name="connsiteY1" fmla="*/ 63497 h 4343400"/>
+              <a:gd name="connsiteX2" fmla="*/ 381000 w 762000"/>
+              <a:gd name="connsiteY2" fmla="*/ 2108203 h 4343400"/>
+              <a:gd name="connsiteX3" fmla="*/ 762000 w 762000"/>
+              <a:gd name="connsiteY3" fmla="*/ 2171700 h 4343400"/>
+              <a:gd name="connsiteX4" fmla="*/ 381000 w 762000"/>
+              <a:gd name="connsiteY4" fmla="*/ 2235197 h 4343400"/>
+              <a:gd name="connsiteX5" fmla="*/ 381000 w 762000"/>
+              <a:gd name="connsiteY5" fmla="*/ 4279903 h 4343400"/>
+              <a:gd name="connsiteX6" fmla="*/ 0 w 762000"/>
+              <a:gd name="connsiteY6" fmla="*/ 4343400 h 4343400"/>
+              <a:gd name="connsiteX7" fmla="*/ 0 w 762000"/>
+              <a:gd name="connsiteY7" fmla="*/ 0 h 4343400"/>
+              <a:gd name="connsiteX0" fmla="*/ 95534 w 762000"/>
+              <a:gd name="connsiteY0" fmla="*/ 40943 h 4343400"/>
+              <a:gd name="connsiteX1" fmla="*/ 381000 w 762000"/>
+              <a:gd name="connsiteY1" fmla="*/ 63497 h 4343400"/>
+              <a:gd name="connsiteX2" fmla="*/ 381000 w 762000"/>
+              <a:gd name="connsiteY2" fmla="*/ 2108203 h 4343400"/>
+              <a:gd name="connsiteX3" fmla="*/ 611875 w 762000"/>
+              <a:gd name="connsiteY3" fmla="*/ 2185348 h 4343400"/>
+              <a:gd name="connsiteX4" fmla="*/ 381000 w 762000"/>
+              <a:gd name="connsiteY4" fmla="*/ 2276140 h 4343400"/>
+              <a:gd name="connsiteX5" fmla="*/ 381000 w 762000"/>
+              <a:gd name="connsiteY5" fmla="*/ 4279903 h 4343400"/>
+              <a:gd name="connsiteX6" fmla="*/ 95534 w 762000"/>
+              <a:gd name="connsiteY6" fmla="*/ 4329753 h 4343400"/>
+              <a:gd name="connsiteX0" fmla="*/ 0 w 762000"/>
+              <a:gd name="connsiteY0" fmla="*/ 0 h 4343400"/>
+              <a:gd name="connsiteX1" fmla="*/ 381000 w 762000"/>
+              <a:gd name="connsiteY1" fmla="*/ 63497 h 4343400"/>
+              <a:gd name="connsiteX2" fmla="*/ 381000 w 762000"/>
+              <a:gd name="connsiteY2" fmla="*/ 2108203 h 4343400"/>
+              <a:gd name="connsiteX3" fmla="*/ 762000 w 762000"/>
+              <a:gd name="connsiteY3" fmla="*/ 2171700 h 4343400"/>
+              <a:gd name="connsiteX4" fmla="*/ 381000 w 762000"/>
+              <a:gd name="connsiteY4" fmla="*/ 2235197 h 4343400"/>
+              <a:gd name="connsiteX5" fmla="*/ 381000 w 762000"/>
+              <a:gd name="connsiteY5" fmla="*/ 4279903 h 4343400"/>
+              <a:gd name="connsiteX6" fmla="*/ 0 w 762000"/>
+              <a:gd name="connsiteY6" fmla="*/ 4343400 h 4343400"/>
+              <a:gd name="connsiteX7" fmla="*/ 0 w 762000"/>
+              <a:gd name="connsiteY7" fmla="*/ 0 h 4343400"/>
+              <a:gd name="connsiteX0" fmla="*/ 95534 w 762000"/>
+              <a:gd name="connsiteY0" fmla="*/ 40943 h 4343400"/>
+              <a:gd name="connsiteX1" fmla="*/ 381000 w 762000"/>
+              <a:gd name="connsiteY1" fmla="*/ 63497 h 4343400"/>
+              <a:gd name="connsiteX2" fmla="*/ 381000 w 762000"/>
+              <a:gd name="connsiteY2" fmla="*/ 2053612 h 4343400"/>
+              <a:gd name="connsiteX3" fmla="*/ 611875 w 762000"/>
+              <a:gd name="connsiteY3" fmla="*/ 2185348 h 4343400"/>
+              <a:gd name="connsiteX4" fmla="*/ 381000 w 762000"/>
+              <a:gd name="connsiteY4" fmla="*/ 2276140 h 4343400"/>
+              <a:gd name="connsiteX5" fmla="*/ 381000 w 762000"/>
+              <a:gd name="connsiteY5" fmla="*/ 4279903 h 4343400"/>
+              <a:gd name="connsiteX6" fmla="*/ 95534 w 762000"/>
+              <a:gd name="connsiteY6" fmla="*/ 4329753 h 4343400"/>
+              <a:gd name="connsiteX0" fmla="*/ 0 w 762000"/>
+              <a:gd name="connsiteY0" fmla="*/ 0 h 4343400"/>
+              <a:gd name="connsiteX1" fmla="*/ 381000 w 762000"/>
+              <a:gd name="connsiteY1" fmla="*/ 63497 h 4343400"/>
+              <a:gd name="connsiteX2" fmla="*/ 381000 w 762000"/>
+              <a:gd name="connsiteY2" fmla="*/ 2108203 h 4343400"/>
+              <a:gd name="connsiteX3" fmla="*/ 762000 w 762000"/>
+              <a:gd name="connsiteY3" fmla="*/ 2171700 h 4343400"/>
+              <a:gd name="connsiteX4" fmla="*/ 381000 w 762000"/>
+              <a:gd name="connsiteY4" fmla="*/ 2235197 h 4343400"/>
+              <a:gd name="connsiteX5" fmla="*/ 381000 w 762000"/>
+              <a:gd name="connsiteY5" fmla="*/ 4279903 h 4343400"/>
+              <a:gd name="connsiteX6" fmla="*/ 0 w 762000"/>
+              <a:gd name="connsiteY6" fmla="*/ 4343400 h 4343400"/>
+              <a:gd name="connsiteX7" fmla="*/ 0 w 762000"/>
+              <a:gd name="connsiteY7" fmla="*/ 0 h 4343400"/>
+              <a:gd name="connsiteX0" fmla="*/ 95534 w 762000"/>
+              <a:gd name="connsiteY0" fmla="*/ 40943 h 4343400"/>
+              <a:gd name="connsiteX1" fmla="*/ 340057 w 762000"/>
+              <a:gd name="connsiteY1" fmla="*/ 104440 h 4343400"/>
+              <a:gd name="connsiteX2" fmla="*/ 381000 w 762000"/>
+              <a:gd name="connsiteY2" fmla="*/ 2053612 h 4343400"/>
+              <a:gd name="connsiteX3" fmla="*/ 611875 w 762000"/>
+              <a:gd name="connsiteY3" fmla="*/ 2185348 h 4343400"/>
+              <a:gd name="connsiteX4" fmla="*/ 381000 w 762000"/>
+              <a:gd name="connsiteY4" fmla="*/ 2276140 h 4343400"/>
+              <a:gd name="connsiteX5" fmla="*/ 381000 w 762000"/>
+              <a:gd name="connsiteY5" fmla="*/ 4279903 h 4343400"/>
+              <a:gd name="connsiteX6" fmla="*/ 95534 w 762000"/>
+              <a:gd name="connsiteY6" fmla="*/ 4329753 h 4343400"/>
+              <a:gd name="connsiteX0" fmla="*/ 0 w 762000"/>
+              <a:gd name="connsiteY0" fmla="*/ 0 h 4343400"/>
+              <a:gd name="connsiteX1" fmla="*/ 381000 w 762000"/>
+              <a:gd name="connsiteY1" fmla="*/ 63497 h 4343400"/>
+              <a:gd name="connsiteX2" fmla="*/ 381000 w 762000"/>
+              <a:gd name="connsiteY2" fmla="*/ 2108203 h 4343400"/>
+              <a:gd name="connsiteX3" fmla="*/ 762000 w 762000"/>
+              <a:gd name="connsiteY3" fmla="*/ 2171700 h 4343400"/>
+              <a:gd name="connsiteX4" fmla="*/ 381000 w 762000"/>
+              <a:gd name="connsiteY4" fmla="*/ 2235197 h 4343400"/>
+              <a:gd name="connsiteX5" fmla="*/ 381000 w 762000"/>
+              <a:gd name="connsiteY5" fmla="*/ 4279903 h 4343400"/>
+              <a:gd name="connsiteX6" fmla="*/ 0 w 762000"/>
+              <a:gd name="connsiteY6" fmla="*/ 4343400 h 4343400"/>
+              <a:gd name="connsiteX7" fmla="*/ 0 w 762000"/>
+              <a:gd name="connsiteY7" fmla="*/ 0 h 4343400"/>
+              <a:gd name="connsiteX0" fmla="*/ 95534 w 762000"/>
+              <a:gd name="connsiteY0" fmla="*/ 40943 h 4343400"/>
+              <a:gd name="connsiteX1" fmla="*/ 340057 w 762000"/>
+              <a:gd name="connsiteY1" fmla="*/ 104440 h 4343400"/>
+              <a:gd name="connsiteX2" fmla="*/ 381000 w 762000"/>
+              <a:gd name="connsiteY2" fmla="*/ 2053612 h 4343400"/>
+              <a:gd name="connsiteX3" fmla="*/ 611875 w 762000"/>
+              <a:gd name="connsiteY3" fmla="*/ 2185348 h 4343400"/>
+              <a:gd name="connsiteX4" fmla="*/ 381000 w 762000"/>
+              <a:gd name="connsiteY4" fmla="*/ 2276140 h 4343400"/>
+              <a:gd name="connsiteX5" fmla="*/ 312762 w 762000"/>
+              <a:gd name="connsiteY5" fmla="*/ 4252607 h 4343400"/>
+              <a:gd name="connsiteX6" fmla="*/ 95534 w 762000"/>
+              <a:gd name="connsiteY6" fmla="*/ 4329753 h 4343400"/>
+            </a:gdLst>
+            <a:ahLst/>
+            <a:cxnLst>
+              <a:cxn ang="0">
+                <a:pos x="connsiteX0" y="connsiteY0"/>
+              </a:cxn>
+              <a:cxn ang="0">
+                <a:pos x="connsiteX1" y="connsiteY1"/>
+              </a:cxn>
+              <a:cxn ang="0">
+                <a:pos x="connsiteX2" y="connsiteY2"/>
+              </a:cxn>
+              <a:cxn ang="0">
+                <a:pos x="connsiteX3" y="connsiteY3"/>
+              </a:cxn>
+              <a:cxn ang="0">
+                <a:pos x="connsiteX4" y="connsiteY4"/>
+              </a:cxn>
+              <a:cxn ang="0">
+                <a:pos x="connsiteX5" y="connsiteY5"/>
+              </a:cxn>
+              <a:cxn ang="0">
+                <a:pos x="connsiteX6" y="connsiteY6"/>
+              </a:cxn>
+            </a:cxnLst>
+            <a:rect l="l" t="t" r="r" b="b"/>
+            <a:pathLst>
+              <a:path w="762000" h="4343400" stroke="0" extrusionOk="0">
+                <a:moveTo>
+                  <a:pt x="0" y="0"/>
+                </a:moveTo>
+                <a:cubicBezTo>
+                  <a:pt x="210420" y="0"/>
+                  <a:pt x="381000" y="28429"/>
+                  <a:pt x="381000" y="63497"/>
+                </a:cubicBezTo>
+                <a:lnTo>
+                  <a:pt x="381000" y="2108203"/>
+                </a:lnTo>
+                <a:cubicBezTo>
+                  <a:pt x="381000" y="2143271"/>
+                  <a:pt x="551580" y="2171700"/>
+                  <a:pt x="762000" y="2171700"/>
+                </a:cubicBezTo>
+                <a:cubicBezTo>
+                  <a:pt x="551580" y="2171700"/>
+                  <a:pt x="381000" y="2200129"/>
+                  <a:pt x="381000" y="2235197"/>
+                </a:cubicBezTo>
+                <a:lnTo>
+                  <a:pt x="381000" y="4279903"/>
+                </a:lnTo>
+                <a:cubicBezTo>
+                  <a:pt x="381000" y="4314971"/>
+                  <a:pt x="210420" y="4343400"/>
+                  <a:pt x="0" y="4343400"/>
+                </a:cubicBezTo>
+                <a:lnTo>
+                  <a:pt x="0" y="0"/>
+                </a:lnTo>
+                <a:close/>
+              </a:path>
+              <a:path w="762000" h="4343400" fill="none">
+                <a:moveTo>
+                  <a:pt x="95534" y="40943"/>
+                </a:moveTo>
+                <a:cubicBezTo>
+                  <a:pt x="305954" y="40943"/>
+                  <a:pt x="340057" y="69372"/>
+                  <a:pt x="340057" y="104440"/>
+                </a:cubicBezTo>
+                <a:lnTo>
+                  <a:pt x="381000" y="2053612"/>
+                </a:lnTo>
+                <a:cubicBezTo>
+                  <a:pt x="381000" y="2088680"/>
+                  <a:pt x="611875" y="2148260"/>
+                  <a:pt x="611875" y="2185348"/>
+                </a:cubicBezTo>
+                <a:cubicBezTo>
+                  <a:pt x="611875" y="2222436"/>
+                  <a:pt x="381000" y="2241072"/>
+                  <a:pt x="381000" y="2276140"/>
+                </a:cubicBezTo>
+                <a:lnTo>
+                  <a:pt x="312762" y="4252607"/>
+                </a:lnTo>
+                <a:cubicBezTo>
+                  <a:pt x="312762" y="4287675"/>
+                  <a:pt x="305954" y="4329753"/>
+                  <a:pt x="95534" y="4329753"/>
+                </a:cubicBezTo>
+              </a:path>
+            </a:pathLst>
+          </a:custGeom>
+          <a:ln w="38100">
+            <a:solidFill>
+              <a:schemeClr val="tx1"/>
+            </a:solidFill>
+          </a:ln>
+        </p:spPr>
+        <p:style>
+          <a:lnRef idx="1">
+            <a:schemeClr val="accent1"/>
+          </a:lnRef>
+          <a:fillRef idx="0">
+            <a:schemeClr val="accent1"/>
+          </a:fillRef>
+          <a:effectRef idx="0">
+            <a:schemeClr val="accent1"/>
+          </a:effectRef>
+          <a:fontRef idx="minor">
+            <a:schemeClr val="tx1"/>
+          </a:fontRef>
+        </p:style>
+        <p:txBody>
+          <a:bodyPr rtlCol="0" anchor="ctr"/>
+          <a:lstStyle/>
+          <a:p>
+            <a:pPr algn="ctr"/>
+            <a:endParaRPr lang="en-GB"/>
+          </a:p>
+        </p:txBody>
+      </p:sp>
+      <p:sp>
+        <p:nvSpPr>
+          <p:cNvPr id="10" name="TextBox 9"/>
+          <p:cNvSpPr txBox="1"/>
+          <p:nvPr/>
+        </p:nvSpPr>
+        <p:spPr>
+          <a:xfrm>
+            <a:off x="6096000" y="1746237"/>
+            <a:ext cx="2273490" cy="2323679"/>
+          </a:xfrm>
+          <a:prstGeom prst="rect">
+            <a:avLst/>
+          </a:prstGeom>
+          <a:noFill/>
+          <a:ln>
+            <a:solidFill>
+              <a:srgbClr val="4E0202"/>
+            </a:solidFill>
+          </a:ln>
+        </p:spPr>
+        <p:txBody>
+          <a:bodyPr wrap="square" rtlCol="0">
+            <a:spAutoFit/>
+          </a:bodyPr>
+          <a:lstStyle/>
+          <a:p>
+            <a:pPr>
+              <a:buSzPct val="80000"/>
+            </a:pPr>
+            <a:r>
+              <a:rPr lang="en-US" dirty="0" smtClean="0">
+                <a:solidFill>
+                  <a:srgbClr val="C00000"/>
+                </a:solidFill>
+              </a:rPr>
+              <a:t>Updates the fitness function.</a:t>
+            </a:r>
+          </a:p>
+          <a:p>
+            <a:pPr>
+              <a:buSzPct val="80000"/>
+            </a:pPr>
+            <a:r>
+              <a:rPr lang="en-US" dirty="0" smtClean="0">
+                <a:solidFill>
+                  <a:srgbClr val="002060"/>
+                </a:solidFill>
+              </a:rPr>
+              <a:t>Updates the </a:t>
+            </a:r>
+            <a:r>
+              <a:rPr lang="en-US" b="1" dirty="0" smtClean="0">
+                <a:solidFill>
+                  <a:srgbClr val="002060"/>
+                </a:solidFill>
+              </a:rPr>
+              <a:t>personal best </a:t>
+            </a:r>
+            <a:r>
+              <a:rPr lang="en-US" dirty="0" smtClean="0">
+                <a:solidFill>
+                  <a:srgbClr val="002060"/>
+                </a:solidFill>
+              </a:rPr>
+              <a:t>fitness value and position </a:t>
+            </a:r>
+            <a:r>
+              <a:rPr lang="en-US" dirty="0" smtClean="0"/>
+              <a:t>and</a:t>
+            </a:r>
+          </a:p>
+          <a:p>
+            <a:pPr>
+              <a:buSzPct val="80000"/>
+            </a:pPr>
+            <a:r>
+              <a:rPr lang="en-US" dirty="0" smtClean="0">
+                <a:solidFill>
+                  <a:srgbClr val="0B4516"/>
+                </a:solidFill>
+              </a:rPr>
+              <a:t>Updates the </a:t>
+            </a:r>
+            <a:r>
+              <a:rPr lang="en-US" b="1" dirty="0" smtClean="0">
+                <a:solidFill>
+                  <a:srgbClr val="0B4516"/>
+                </a:solidFill>
+              </a:rPr>
+              <a:t>global best </a:t>
+            </a:r>
+            <a:r>
+              <a:rPr lang="en-US" dirty="0" smtClean="0">
+                <a:solidFill>
+                  <a:srgbClr val="0B4516"/>
+                </a:solidFill>
+              </a:rPr>
+              <a:t>value and position</a:t>
+            </a:r>
+            <a:endParaRPr lang="en-GB" dirty="0">
+              <a:solidFill>
+                <a:srgbClr val="0B4516"/>
+              </a:solidFill>
+            </a:endParaRPr>
+          </a:p>
+        </p:txBody>
+      </p:sp>
+      <p:sp>
+        <p:nvSpPr>
+          <p:cNvPr id="11" name="TextBox 10"/>
+          <p:cNvSpPr txBox="1"/>
+          <p:nvPr/>
+        </p:nvSpPr>
+        <p:spPr>
+          <a:xfrm>
+            <a:off x="6096000" y="4724400"/>
+            <a:ext cx="1676400" cy="923330"/>
+          </a:xfrm>
+          <a:prstGeom prst="rect">
+            <a:avLst/>
+          </a:prstGeom>
+          <a:noFill/>
+        </p:spPr>
+        <p:txBody>
+          <a:bodyPr wrap="square" rtlCol="0">
+            <a:spAutoFit/>
+          </a:bodyPr>
+          <a:lstStyle/>
+          <a:p>
+            <a:r>
+              <a:rPr lang="en-US" dirty="0" smtClean="0"/>
+              <a:t>Calculates the new velocity</a:t>
+            </a:r>
+          </a:p>
+          <a:p>
+            <a:endParaRPr lang="en-GB" dirty="0"/>
           </a:p>
         </p:txBody>
       </p:sp>

</xml_diff>